<commit_message>
update testing-confidence.pptx with end of prob-bayes.pptx
</commit_message>
<xml_diff>
--- a/spring16/slidesS16/testing-confidence.pptx
+++ b/spring16/slidesS16/testing-confidence.pptx
@@ -5,10 +5,10 @@
     <p:sldMasterId id="2147483650" r:id="rId1"/>
   </p:sldMasterIdLst>
   <p:notesMasterIdLst>
-    <p:notesMasterId r:id="rId37"/>
+    <p:notesMasterId r:id="rId44"/>
   </p:notesMasterIdLst>
   <p:handoutMasterIdLst>
-    <p:handoutMasterId r:id="rId38"/>
+    <p:handoutMasterId r:id="rId45"/>
   </p:handoutMasterIdLst>
   <p:sldIdLst>
     <p:sldId id="322" r:id="rId2"/>
@@ -46,11 +46,18 @@
     <p:sldId id="475" r:id="rId34"/>
     <p:sldId id="430" r:id="rId35"/>
     <p:sldId id="395" r:id="rId36"/>
+    <p:sldId id="479" r:id="rId37"/>
+    <p:sldId id="480" r:id="rId38"/>
+    <p:sldId id="476" r:id="rId39"/>
+    <p:sldId id="481" r:id="rId40"/>
+    <p:sldId id="482" r:id="rId41"/>
+    <p:sldId id="478" r:id="rId42"/>
+    <p:sldId id="483" r:id="rId43"/>
   </p:sldIdLst>
   <p:sldSz cx="9144000" cy="6858000" type="screen4x3"/>
   <p:notesSz cx="9601200" cy="7315200"/>
   <p:custDataLst>
-    <p:tags r:id="rId40"/>
+    <p:tags r:id="rId47"/>
   </p:custDataLst>
   <p:defaultTextStyle>
     <a:defPPr>
@@ -6576,7 +6583,7 @@
           <a:graphicData uri="http://schemas.openxmlformats.org/presentationml/2006/ole">
             <mc:AlternateContent xmlns:mc="http://schemas.openxmlformats.org/markup-compatibility/2006">
               <mc:Choice xmlns:v="urn:schemas-microsoft-com:vml" Requires="v">
-                <p:oleObj spid="_x0000_s1075" name="Equation" r:id="rId3" imgW="977900" imgH="241300" progId="Equation.DSMT4">
+                <p:oleObj spid="_x0000_s1081" name="Equation" r:id="rId3" imgW="977900" imgH="241300" progId="Equation.DSMT4">
                   <p:embed/>
                 </p:oleObj>
               </mc:Choice>
@@ -6908,7 +6915,7 @@
           <a:graphicData uri="http://schemas.openxmlformats.org/presentationml/2006/ole">
             <mc:AlternateContent xmlns:mc="http://schemas.openxmlformats.org/markup-compatibility/2006">
               <mc:Choice xmlns:v="urn:schemas-microsoft-com:vml" Requires="v">
-                <p:oleObj spid="_x0000_s99359" name="Equation" r:id="rId3" imgW="977900" imgH="241300" progId="Equation.DSMT4">
+                <p:oleObj spid="_x0000_s99365" name="Equation" r:id="rId3" imgW="977900" imgH="241300" progId="Equation.DSMT4">
                   <p:embed/>
                 </p:oleObj>
               </mc:Choice>
@@ -7200,7 +7207,7 @@
           <a:graphicData uri="http://schemas.openxmlformats.org/presentationml/2006/ole">
             <mc:AlternateContent xmlns:mc="http://schemas.openxmlformats.org/markup-compatibility/2006">
               <mc:Choice xmlns:v="urn:schemas-microsoft-com:vml" Requires="v">
-                <p:oleObj spid="_x0000_s100385" name="Equation" r:id="rId3" imgW="977900" imgH="241300" progId="Equation.DSMT4">
+                <p:oleObj spid="_x0000_s100391" name="Equation" r:id="rId3" imgW="977900" imgH="241300" progId="Equation.DSMT4">
                   <p:embed/>
                 </p:oleObj>
               </mc:Choice>
@@ -7412,7 +7419,7 @@
           <a:graphicData uri="http://schemas.openxmlformats.org/presentationml/2006/ole">
             <mc:AlternateContent xmlns:mc="http://schemas.openxmlformats.org/markup-compatibility/2006">
               <mc:Choice xmlns:v="urn:schemas-microsoft-com:vml" Requires="v">
-                <p:oleObj spid="_x0000_s101434" name="Equation" r:id="rId3" imgW="889000" imgH="241300" progId="Equation.DSMT4">
+                <p:oleObj spid="_x0000_s101445" name="Equation" r:id="rId3" imgW="889000" imgH="241300" progId="Equation.DSMT4">
                   <p:embed/>
                 </p:oleObj>
               </mc:Choice>
@@ -7524,7 +7531,7 @@
           <a:graphicData uri="http://schemas.openxmlformats.org/presentationml/2006/ole">
             <mc:AlternateContent xmlns:mc="http://schemas.openxmlformats.org/markup-compatibility/2006">
               <mc:Choice xmlns:v="urn:schemas-microsoft-com:vml" Requires="v">
-                <p:oleObj spid="_x0000_s101435" name="Equation" r:id="rId5" imgW="977900" imgH="241300" progId="Equation.DSMT4">
+                <p:oleObj spid="_x0000_s101446" name="Equation" r:id="rId5" imgW="977900" imgH="241300" progId="Equation.DSMT4">
                   <p:embed/>
                 </p:oleObj>
               </mc:Choice>
@@ -7878,7 +7885,7 @@
             <a:graphicData uri="http://schemas.openxmlformats.org/presentationml/2006/ole">
               <mc:AlternateContent xmlns:mc="http://schemas.openxmlformats.org/markup-compatibility/2006">
                 <mc:Choice xmlns:v="urn:schemas-microsoft-com:vml" Requires="v">
-                  <p:oleObj spid="_x0000_s35952" name="Equation" r:id="rId4" imgW="850900" imgH="228600" progId="Equation.DSMT4">
+                  <p:oleObj spid="_x0000_s35963" name="Equation" r:id="rId4" imgW="850900" imgH="228600" progId="Equation.DSMT4">
                     <p:embed/>
                   </p:oleObj>
                 </mc:Choice>
@@ -7935,7 +7942,7 @@
             <a:graphicData uri="http://schemas.openxmlformats.org/presentationml/2006/ole">
               <mc:AlternateContent xmlns:mc="http://schemas.openxmlformats.org/markup-compatibility/2006">
                 <mc:Choice xmlns:v="urn:schemas-microsoft-com:vml" Requires="v">
-                  <p:oleObj spid="_x0000_s35953" name="Equation" r:id="rId6" imgW="850900" imgH="228600" progId="Equation.DSMT4">
+                  <p:oleObj spid="_x0000_s35964" name="Equation" r:id="rId6" imgW="850900" imgH="228600" progId="Equation.DSMT4">
                     <p:embed/>
                   </p:oleObj>
                 </mc:Choice>
@@ -8725,7 +8732,7 @@
           <a:graphicData uri="http://schemas.openxmlformats.org/presentationml/2006/ole">
             <mc:AlternateContent xmlns:mc="http://schemas.openxmlformats.org/markup-compatibility/2006">
               <mc:Choice xmlns:v="urn:schemas-microsoft-com:vml" Requires="v">
-                <p:oleObj spid="_x0000_s88098" name="Equation" r:id="rId3" imgW="1257300" imgH="495300" progId="Equation.DSMT4">
+                <p:oleObj spid="_x0000_s88104" name="Equation" r:id="rId3" imgW="1257300" imgH="495300" progId="Equation.DSMT4">
                   <p:embed/>
                 </p:oleObj>
               </mc:Choice>
@@ -9064,7 +9071,7 @@
           <a:graphicData uri="http://schemas.openxmlformats.org/presentationml/2006/ole">
             <mc:AlternateContent xmlns:mc="http://schemas.openxmlformats.org/markup-compatibility/2006">
               <mc:Choice xmlns:v="urn:schemas-microsoft-com:vml" Requires="v">
-                <p:oleObj spid="_x0000_s89148" name="Equation" r:id="rId3" imgW="952500" imgH="469900" progId="Equation.DSMT4">
+                <p:oleObj spid="_x0000_s89159" name="Equation" r:id="rId3" imgW="952500" imgH="469900" progId="Equation.DSMT4">
                   <p:embed/>
                 </p:oleObj>
               </mc:Choice>
@@ -9121,7 +9128,7 @@
           <a:graphicData uri="http://schemas.openxmlformats.org/presentationml/2006/ole">
             <mc:AlternateContent xmlns:mc="http://schemas.openxmlformats.org/markup-compatibility/2006">
               <mc:Choice xmlns:v="urn:schemas-microsoft-com:vml" Requires="v">
-                <p:oleObj spid="_x0000_s89149" name="Equation" r:id="rId5" imgW="1701800" imgH="469900" progId="Equation.DSMT4">
+                <p:oleObj spid="_x0000_s89160" name="Equation" r:id="rId5" imgW="1701800" imgH="469900" progId="Equation.DSMT4">
                   <p:embed/>
                 </p:oleObj>
               </mc:Choice>
@@ -9475,7 +9482,7 @@
           <a:graphicData uri="http://schemas.openxmlformats.org/presentationml/2006/ole">
             <mc:AlternateContent xmlns:mc="http://schemas.openxmlformats.org/markup-compatibility/2006">
               <mc:Choice xmlns:v="urn:schemas-microsoft-com:vml" Requires="v">
-                <p:oleObj spid="_x0000_s32831" name="Equation" r:id="rId4" imgW="1765300" imgH="495300" progId="Equation.DSMT4">
+                <p:oleObj spid="_x0000_s32837" name="Equation" r:id="rId4" imgW="1765300" imgH="495300" progId="Equation.DSMT4">
                   <p:embed/>
                 </p:oleObj>
               </mc:Choice>
@@ -9789,7 +9796,7 @@
           <a:graphicData uri="http://schemas.openxmlformats.org/presentationml/2006/ole">
             <mc:AlternateContent xmlns:mc="http://schemas.openxmlformats.org/markup-compatibility/2006">
               <mc:Choice xmlns:v="urn:schemas-microsoft-com:vml" Requires="v">
-                <p:oleObj spid="_x0000_s79931" name="Equation" r:id="rId4" imgW="1092200" imgH="228600" progId="Equation.DSMT4">
+                <p:oleObj spid="_x0000_s79937" name="Equation" r:id="rId4" imgW="1092200" imgH="228600" progId="Equation.DSMT4">
                   <p:embed/>
                 </p:oleObj>
               </mc:Choice>
@@ -10155,7 +10162,7 @@
           <a:graphicData uri="http://schemas.openxmlformats.org/presentationml/2006/ole">
             <mc:AlternateContent xmlns:mc="http://schemas.openxmlformats.org/markup-compatibility/2006">
               <mc:Choice xmlns:v="urn:schemas-microsoft-com:vml" Requires="v">
-                <p:oleObj spid="_x0000_s136241" name="Equation" r:id="rId4" imgW="2146300" imgH="495300" progId="Equation.DSMT4">
+                <p:oleObj spid="_x0000_s136252" name="Equation" r:id="rId4" imgW="2146300" imgH="495300" progId="Equation.DSMT4">
                   <p:embed/>
                 </p:oleObj>
               </mc:Choice>
@@ -10212,7 +10219,7 @@
           <a:graphicData uri="http://schemas.openxmlformats.org/presentationml/2006/ole">
             <mc:AlternateContent xmlns:mc="http://schemas.openxmlformats.org/markup-compatibility/2006">
               <mc:Choice xmlns:v="urn:schemas-microsoft-com:vml" Requires="v">
-                <p:oleObj spid="_x0000_s136242" name="Equation" r:id="rId6" imgW="2171700" imgH="495300" progId="Equation.DSMT4">
+                <p:oleObj spid="_x0000_s136253" name="Equation" r:id="rId6" imgW="2171700" imgH="495300" progId="Equation.DSMT4">
                   <p:embed/>
                 </p:oleObj>
               </mc:Choice>
@@ -10578,7 +10585,7 @@
           <a:graphicData uri="http://schemas.openxmlformats.org/presentationml/2006/ole">
             <mc:AlternateContent xmlns:mc="http://schemas.openxmlformats.org/markup-compatibility/2006">
               <mc:Choice xmlns:v="urn:schemas-microsoft-com:vml" Requires="v">
-                <p:oleObj spid="_x0000_s133271" name="Equation" r:id="rId4" imgW="2171700" imgH="495300" progId="Equation.DSMT4">
+                <p:oleObj spid="_x0000_s133302" name="Equation" r:id="rId4" imgW="2171700" imgH="495300" progId="Equation.DSMT4">
                   <p:embed/>
                 </p:oleObj>
               </mc:Choice>
@@ -10689,7 +10696,7 @@
           <a:graphicData uri="http://schemas.openxmlformats.org/presentationml/2006/ole">
             <mc:AlternateContent xmlns:mc="http://schemas.openxmlformats.org/markup-compatibility/2006">
               <mc:Choice xmlns:v="urn:schemas-microsoft-com:vml" Requires="v">
-                <p:oleObj spid="_x0000_s133272" name="Equation" r:id="rId6" imgW="139700" imgH="215900" progId="Equation.DSMT4">
+                <p:oleObj spid="_x0000_s133303" name="Equation" r:id="rId6" imgW="139700" imgH="215900" progId="Equation.DSMT4">
                   <p:embed/>
                 </p:oleObj>
               </mc:Choice>
@@ -10746,7 +10753,7 @@
           <a:graphicData uri="http://schemas.openxmlformats.org/presentationml/2006/ole">
             <mc:AlternateContent xmlns:mc="http://schemas.openxmlformats.org/markup-compatibility/2006">
               <mc:Choice xmlns:v="urn:schemas-microsoft-com:vml" Requires="v">
-                <p:oleObj spid="_x0000_s133273" name="Equation" r:id="rId8" imgW="139700" imgH="215900" progId="Equation.DSMT4">
+                <p:oleObj spid="_x0000_s133304" name="Equation" r:id="rId8" imgW="139700" imgH="215900" progId="Equation.DSMT4">
                   <p:embed/>
                 </p:oleObj>
               </mc:Choice>
@@ -10803,7 +10810,7 @@
           <a:graphicData uri="http://schemas.openxmlformats.org/presentationml/2006/ole">
             <mc:AlternateContent xmlns:mc="http://schemas.openxmlformats.org/markup-compatibility/2006">
               <mc:Choice xmlns:v="urn:schemas-microsoft-com:vml" Requires="v">
-                <p:oleObj spid="_x0000_s133274" name="Equation" r:id="rId9" imgW="762000" imgH="533400" progId="Equation.DSMT4">
+                <p:oleObj spid="_x0000_s133305" name="Equation" r:id="rId9" imgW="762000" imgH="533400" progId="Equation.DSMT4">
                   <p:embed/>
                 </p:oleObj>
               </mc:Choice>
@@ -10860,7 +10867,7 @@
           <a:graphicData uri="http://schemas.openxmlformats.org/presentationml/2006/ole">
             <mc:AlternateContent xmlns:mc="http://schemas.openxmlformats.org/markup-compatibility/2006">
               <mc:Choice xmlns:v="urn:schemas-microsoft-com:vml" Requires="v">
-                <p:oleObj spid="_x0000_s133275" name="Equation" r:id="rId11" imgW="584200" imgH="533400" progId="Equation.DSMT4">
+                <p:oleObj spid="_x0000_s133306" name="Equation" r:id="rId11" imgW="584200" imgH="533400" progId="Equation.DSMT4">
                   <p:embed/>
                 </p:oleObj>
               </mc:Choice>
@@ -10917,7 +10924,7 @@
           <a:graphicData uri="http://schemas.openxmlformats.org/presentationml/2006/ole">
             <mc:AlternateContent xmlns:mc="http://schemas.openxmlformats.org/markup-compatibility/2006">
               <mc:Choice xmlns:v="urn:schemas-microsoft-com:vml" Requires="v">
-                <p:oleObj spid="_x0000_s133276" name="Equation" r:id="rId13" imgW="2146300" imgH="495300" progId="Equation.DSMT4">
+                <p:oleObj spid="_x0000_s133307" name="Equation" r:id="rId13" imgW="2146300" imgH="495300" progId="Equation.DSMT4">
                   <p:embed/>
                 </p:oleObj>
               </mc:Choice>
@@ -11207,7 +11214,7 @@
           <a:graphicData uri="http://schemas.openxmlformats.org/presentationml/2006/ole">
             <mc:AlternateContent xmlns:mc="http://schemas.openxmlformats.org/markup-compatibility/2006">
               <mc:Choice xmlns:v="urn:schemas-microsoft-com:vml" Requires="v">
-                <p:oleObj spid="_x0000_s134239" name="Equation" r:id="rId4" imgW="1244600" imgH="228600" progId="Equation.DSMT4">
+                <p:oleObj spid="_x0000_s134260" name="Equation" r:id="rId4" imgW="1244600" imgH="228600" progId="Equation.DSMT4">
                   <p:embed/>
                 </p:oleObj>
               </mc:Choice>
@@ -11264,7 +11271,7 @@
           <a:graphicData uri="http://schemas.openxmlformats.org/presentationml/2006/ole">
             <mc:AlternateContent xmlns:mc="http://schemas.openxmlformats.org/markup-compatibility/2006">
               <mc:Choice xmlns:v="urn:schemas-microsoft-com:vml" Requires="v">
-                <p:oleObj spid="_x0000_s134240" name="Equation" r:id="rId6" imgW="1612900" imgH="495300" progId="Equation.DSMT4">
+                <p:oleObj spid="_x0000_s134261" name="Equation" r:id="rId6" imgW="1612900" imgH="495300" progId="Equation.DSMT4">
                   <p:embed/>
                 </p:oleObj>
               </mc:Choice>
@@ -11321,7 +11328,7 @@
           <a:graphicData uri="http://schemas.openxmlformats.org/presentationml/2006/ole">
             <mc:AlternateContent xmlns:mc="http://schemas.openxmlformats.org/markup-compatibility/2006">
               <mc:Choice xmlns:v="urn:schemas-microsoft-com:vml" Requires="v">
-                <p:oleObj spid="_x0000_s134241" name="Equation" r:id="rId8" imgW="139700" imgH="215900" progId="Equation.DSMT4">
+                <p:oleObj spid="_x0000_s134262" name="Equation" r:id="rId8" imgW="139700" imgH="215900" progId="Equation.DSMT4">
                   <p:embed/>
                 </p:oleObj>
               </mc:Choice>
@@ -11378,7 +11385,7 @@
           <a:graphicData uri="http://schemas.openxmlformats.org/presentationml/2006/ole">
             <mc:AlternateContent xmlns:mc="http://schemas.openxmlformats.org/markup-compatibility/2006">
               <mc:Choice xmlns:v="urn:schemas-microsoft-com:vml" Requires="v">
-                <p:oleObj spid="_x0000_s134242" name="Equation" r:id="rId10" imgW="139700" imgH="215900" progId="Equation.DSMT4">
+                <p:oleObj spid="_x0000_s134263" name="Equation" r:id="rId10" imgW="139700" imgH="215900" progId="Equation.DSMT4">
                   <p:embed/>
                 </p:oleObj>
               </mc:Choice>
@@ -11668,7 +11675,7 @@
           <a:graphicData uri="http://schemas.openxmlformats.org/presentationml/2006/ole">
             <mc:AlternateContent xmlns:mc="http://schemas.openxmlformats.org/markup-compatibility/2006">
               <mc:Choice xmlns:v="urn:schemas-microsoft-com:vml" Requires="v">
-                <p:oleObj spid="_x0000_s135279" name="Equation" r:id="rId4" imgW="1828800" imgH="495300" progId="Equation.DSMT4">
+                <p:oleObj spid="_x0000_s135305" name="Equation" r:id="rId4" imgW="1828800" imgH="495300" progId="Equation.DSMT4">
                   <p:embed/>
                 </p:oleObj>
               </mc:Choice>
@@ -11725,7 +11732,7 @@
           <a:graphicData uri="http://schemas.openxmlformats.org/presentationml/2006/ole">
             <mc:AlternateContent xmlns:mc="http://schemas.openxmlformats.org/markup-compatibility/2006">
               <mc:Choice xmlns:v="urn:schemas-microsoft-com:vml" Requires="v">
-                <p:oleObj spid="_x0000_s135280" name="Equation" r:id="rId6" imgW="139700" imgH="215900" progId="Equation.DSMT4">
+                <p:oleObj spid="_x0000_s135306" name="Equation" r:id="rId6" imgW="139700" imgH="215900" progId="Equation.DSMT4">
                   <p:embed/>
                 </p:oleObj>
               </mc:Choice>
@@ -11782,7 +11789,7 @@
           <a:graphicData uri="http://schemas.openxmlformats.org/presentationml/2006/ole">
             <mc:AlternateContent xmlns:mc="http://schemas.openxmlformats.org/markup-compatibility/2006">
               <mc:Choice xmlns:v="urn:schemas-microsoft-com:vml" Requires="v">
-                <p:oleObj spid="_x0000_s135281" name="Equation" r:id="rId8" imgW="139700" imgH="215900" progId="Equation.DSMT4">
+                <p:oleObj spid="_x0000_s135307" name="Equation" r:id="rId8" imgW="139700" imgH="215900" progId="Equation.DSMT4">
                   <p:embed/>
                 </p:oleObj>
               </mc:Choice>
@@ -11839,7 +11846,7 @@
           <a:graphicData uri="http://schemas.openxmlformats.org/presentationml/2006/ole">
             <mc:AlternateContent xmlns:mc="http://schemas.openxmlformats.org/markup-compatibility/2006">
               <mc:Choice xmlns:v="urn:schemas-microsoft-com:vml" Requires="v">
-                <p:oleObj spid="_x0000_s135282" name="Equation" r:id="rId9" imgW="635000" imgH="469900" progId="Equation.DSMT4">
+                <p:oleObj spid="_x0000_s135308" name="Equation" r:id="rId9" imgW="635000" imgH="469900" progId="Equation.DSMT4">
                   <p:embed/>
                 </p:oleObj>
               </mc:Choice>
@@ -11896,7 +11903,7 @@
           <a:graphicData uri="http://schemas.openxmlformats.org/presentationml/2006/ole">
             <mc:AlternateContent xmlns:mc="http://schemas.openxmlformats.org/markup-compatibility/2006">
               <mc:Choice xmlns:v="urn:schemas-microsoft-com:vml" Requires="v">
-                <p:oleObj spid="_x0000_s135283" name="Equation" r:id="rId11" imgW="1244600" imgH="228600" progId="Equation.DSMT4">
+                <p:oleObj spid="_x0000_s135309" name="Equation" r:id="rId11" imgW="1244600" imgH="228600" progId="Equation.DSMT4">
                   <p:embed/>
                 </p:oleObj>
               </mc:Choice>
@@ -12300,7 +12307,7 @@
           <a:graphicData uri="http://schemas.openxmlformats.org/presentationml/2006/ole">
             <mc:AlternateContent xmlns:mc="http://schemas.openxmlformats.org/markup-compatibility/2006">
               <mc:Choice xmlns:v="urn:schemas-microsoft-com:vml" Requires="v">
-                <p:oleObj spid="_x0000_s137328" name="Equation" r:id="rId4" imgW="1384300" imgH="469900" progId="Equation.DSMT4">
+                <p:oleObj spid="_x0000_s137354" name="Equation" r:id="rId4" imgW="1384300" imgH="469900" progId="Equation.DSMT4">
                   <p:embed/>
                 </p:oleObj>
               </mc:Choice>
@@ -12357,7 +12364,7 @@
           <a:graphicData uri="http://schemas.openxmlformats.org/presentationml/2006/ole">
             <mc:AlternateContent xmlns:mc="http://schemas.openxmlformats.org/markup-compatibility/2006">
               <mc:Choice xmlns:v="urn:schemas-microsoft-com:vml" Requires="v">
-                <p:oleObj spid="_x0000_s137329" name="Equation" r:id="rId6" imgW="139700" imgH="215900" progId="Equation.DSMT4">
+                <p:oleObj spid="_x0000_s137355" name="Equation" r:id="rId6" imgW="139700" imgH="215900" progId="Equation.DSMT4">
                   <p:embed/>
                 </p:oleObj>
               </mc:Choice>
@@ -12414,7 +12421,7 @@
           <a:graphicData uri="http://schemas.openxmlformats.org/presentationml/2006/ole">
             <mc:AlternateContent xmlns:mc="http://schemas.openxmlformats.org/markup-compatibility/2006">
               <mc:Choice xmlns:v="urn:schemas-microsoft-com:vml" Requires="v">
-                <p:oleObj spid="_x0000_s137330" name="Equation" r:id="rId8" imgW="139700" imgH="215900" progId="Equation.DSMT4">
+                <p:oleObj spid="_x0000_s137356" name="Equation" r:id="rId8" imgW="139700" imgH="215900" progId="Equation.DSMT4">
                   <p:embed/>
                 </p:oleObj>
               </mc:Choice>
@@ -12471,7 +12478,7 @@
           <a:graphicData uri="http://schemas.openxmlformats.org/presentationml/2006/ole">
             <mc:AlternateContent xmlns:mc="http://schemas.openxmlformats.org/markup-compatibility/2006">
               <mc:Choice xmlns:v="urn:schemas-microsoft-com:vml" Requires="v">
-                <p:oleObj spid="_x0000_s137331" name="Equation" r:id="rId9" imgW="571500" imgH="457200" progId="Equation.DSMT4">
+                <p:oleObj spid="_x0000_s137357" name="Equation" r:id="rId9" imgW="571500" imgH="457200" progId="Equation.DSMT4">
                   <p:embed/>
                 </p:oleObj>
               </mc:Choice>
@@ -12528,7 +12535,7 @@
           <a:graphicData uri="http://schemas.openxmlformats.org/presentationml/2006/ole">
             <mc:AlternateContent xmlns:mc="http://schemas.openxmlformats.org/markup-compatibility/2006">
               <mc:Choice xmlns:v="urn:schemas-microsoft-com:vml" Requires="v">
-                <p:oleObj spid="_x0000_s137332" name="Equation" r:id="rId11" imgW="1244600" imgH="228600" progId="Equation.DSMT4">
+                <p:oleObj spid="_x0000_s137358" name="Equation" r:id="rId11" imgW="1244600" imgH="228600" progId="Equation.DSMT4">
                   <p:embed/>
                 </p:oleObj>
               </mc:Choice>
@@ -12818,7 +12825,7 @@
           <a:graphicData uri="http://schemas.openxmlformats.org/presentationml/2006/ole">
             <mc:AlternateContent xmlns:mc="http://schemas.openxmlformats.org/markup-compatibility/2006">
               <mc:Choice xmlns:v="urn:schemas-microsoft-com:vml" Requires="v">
-                <p:oleObj spid="_x0000_s138347" name="Equation" r:id="rId4" imgW="139700" imgH="215900" progId="Equation.DSMT4">
+                <p:oleObj spid="_x0000_s138373" name="Equation" r:id="rId4" imgW="139700" imgH="215900" progId="Equation.DSMT4">
                   <p:embed/>
                 </p:oleObj>
               </mc:Choice>
@@ -12875,7 +12882,7 @@
           <a:graphicData uri="http://schemas.openxmlformats.org/presentationml/2006/ole">
             <mc:AlternateContent xmlns:mc="http://schemas.openxmlformats.org/markup-compatibility/2006">
               <mc:Choice xmlns:v="urn:schemas-microsoft-com:vml" Requires="v">
-                <p:oleObj spid="_x0000_s138348" name="Equation" r:id="rId6" imgW="139700" imgH="215900" progId="Equation.DSMT4">
+                <p:oleObj spid="_x0000_s138374" name="Equation" r:id="rId6" imgW="139700" imgH="215900" progId="Equation.DSMT4">
                   <p:embed/>
                 </p:oleObj>
               </mc:Choice>
@@ -12932,7 +12939,7 @@
           <a:graphicData uri="http://schemas.openxmlformats.org/presentationml/2006/ole">
             <mc:AlternateContent xmlns:mc="http://schemas.openxmlformats.org/markup-compatibility/2006">
               <mc:Choice xmlns:v="urn:schemas-microsoft-com:vml" Requires="v">
-                <p:oleObj spid="_x0000_s138349" name="Equation" r:id="rId7" imgW="1193800" imgH="469900" progId="Equation.DSMT4">
+                <p:oleObj spid="_x0000_s138375" name="Equation" r:id="rId7" imgW="1193800" imgH="469900" progId="Equation.DSMT4">
                   <p:embed/>
                 </p:oleObj>
               </mc:Choice>
@@ -12989,7 +12996,7 @@
           <a:graphicData uri="http://schemas.openxmlformats.org/presentationml/2006/ole">
             <mc:AlternateContent xmlns:mc="http://schemas.openxmlformats.org/markup-compatibility/2006">
               <mc:Choice xmlns:v="urn:schemas-microsoft-com:vml" Requires="v">
-                <p:oleObj spid="_x0000_s138350" name="Equation" r:id="rId9" imgW="571500" imgH="457200" progId="Equation.DSMT4">
+                <p:oleObj spid="_x0000_s138376" name="Equation" r:id="rId9" imgW="571500" imgH="457200" progId="Equation.DSMT4">
                   <p:embed/>
                 </p:oleObj>
               </mc:Choice>
@@ -13046,7 +13053,7 @@
           <a:graphicData uri="http://schemas.openxmlformats.org/presentationml/2006/ole">
             <mc:AlternateContent xmlns:mc="http://schemas.openxmlformats.org/markup-compatibility/2006">
               <mc:Choice xmlns:v="urn:schemas-microsoft-com:vml" Requires="v">
-                <p:oleObj spid="_x0000_s138351" name="Equation" r:id="rId11" imgW="1244600" imgH="228600" progId="Equation.DSMT4">
+                <p:oleObj spid="_x0000_s138377" name="Equation" r:id="rId11" imgW="1244600" imgH="228600" progId="Equation.DSMT4">
                   <p:embed/>
                 </p:oleObj>
               </mc:Choice>
@@ -13718,7 +13725,7 @@
           <a:graphicData uri="http://schemas.openxmlformats.org/presentationml/2006/ole">
             <mc:AlternateContent xmlns:mc="http://schemas.openxmlformats.org/markup-compatibility/2006">
               <mc:Choice xmlns:v="urn:schemas-microsoft-com:vml" Requires="v">
-                <p:oleObj spid="_x0000_s27703" name="Equation" r:id="rId4" imgW="1193800" imgH="495300" progId="Equation.DSMT4">
+                <p:oleObj spid="_x0000_s27709" name="Equation" r:id="rId4" imgW="1193800" imgH="495300" progId="Equation.DSMT4">
                   <p:embed/>
                 </p:oleObj>
               </mc:Choice>
@@ -14352,7 +14359,7 @@
           <a:graphicData uri="http://schemas.openxmlformats.org/presentationml/2006/ole">
             <mc:AlternateContent xmlns:mc="http://schemas.openxmlformats.org/markup-compatibility/2006">
               <mc:Choice xmlns:v="urn:schemas-microsoft-com:vml" Requires="v">
-                <p:oleObj spid="_x0000_s62515" name="Equation" r:id="rId4" imgW="1498600" imgH="215900" progId="Equation.DSMT4">
+                <p:oleObj spid="_x0000_s62521" name="Equation" r:id="rId4" imgW="1498600" imgH="215900" progId="Equation.DSMT4">
                   <p:embed/>
                 </p:oleObj>
               </mc:Choice>
@@ -14642,7 +14649,7 @@
           <a:graphicData uri="http://schemas.openxmlformats.org/presentationml/2006/ole">
             <mc:AlternateContent xmlns:mc="http://schemas.openxmlformats.org/markup-compatibility/2006">
               <mc:Choice xmlns:v="urn:schemas-microsoft-com:vml" Requires="v">
-                <p:oleObj spid="_x0000_s139294" name="Equation" r:id="rId4" imgW="1968500" imgH="469900" progId="Equation.DSMT4">
+                <p:oleObj spid="_x0000_s139300" name="Equation" r:id="rId4" imgW="1968500" imgH="469900" progId="Equation.DSMT4">
                   <p:embed/>
                 </p:oleObj>
               </mc:Choice>
@@ -15008,7 +15015,7 @@
           <a:graphicData uri="http://schemas.openxmlformats.org/presentationml/2006/ole">
             <mc:AlternateContent xmlns:mc="http://schemas.openxmlformats.org/markup-compatibility/2006">
               <mc:Choice xmlns:v="urn:schemas-microsoft-com:vml" Requires="v">
-                <p:oleObj spid="_x0000_s154654" name="Equation" r:id="rId4" imgW="1739900" imgH="228600" progId="Equation.DSMT4">
+                <p:oleObj spid="_x0000_s154665" name="Equation" r:id="rId4" imgW="1739900" imgH="228600" progId="Equation.DSMT4">
                   <p:embed/>
                 </p:oleObj>
               </mc:Choice>
@@ -15065,7 +15072,7 @@
           <a:graphicData uri="http://schemas.openxmlformats.org/presentationml/2006/ole">
             <mc:AlternateContent xmlns:mc="http://schemas.openxmlformats.org/markup-compatibility/2006">
               <mc:Choice xmlns:v="urn:schemas-microsoft-com:vml" Requires="v">
-                <p:oleObj spid="_x0000_s154655" name="Equation" r:id="rId6" imgW="1701800" imgH="228600" progId="Equation.DSMT4">
+                <p:oleObj spid="_x0000_s154666" name="Equation" r:id="rId6" imgW="1701800" imgH="228600" progId="Equation.DSMT4">
                   <p:embed/>
                 </p:oleObj>
               </mc:Choice>
@@ -15522,7 +15529,7 @@
           <a:graphicData uri="http://schemas.openxmlformats.org/presentationml/2006/ole">
             <mc:AlternateContent xmlns:mc="http://schemas.openxmlformats.org/markup-compatibility/2006">
               <mc:Choice xmlns:v="urn:schemas-microsoft-com:vml" Requires="v">
-                <p:oleObj spid="_x0000_s82985" name="Equation" r:id="rId4" imgW="1155700" imgH="469900" progId="Equation.DSMT4">
+                <p:oleObj spid="_x0000_s82991" name="Equation" r:id="rId4" imgW="1155700" imgH="469900" progId="Equation.DSMT4">
                   <p:embed/>
                 </p:oleObj>
               </mc:Choice>
@@ -16454,6 +16461,2019 @@
 </p:sld>
 </file>
 
+<file path=ppt/slides/slide36.xml><?xml version="1.0" encoding="utf-8"?>
+<p:sld xmlns:a="http://schemas.openxmlformats.org/drawingml/2006/main" xmlns:r="http://schemas.openxmlformats.org/officeDocument/2006/relationships" xmlns:p="http://schemas.openxmlformats.org/presentationml/2006/main">
+  <p:cSld>
+    <p:spTree>
+      <p:nvGrpSpPr>
+        <p:cNvPr id="1" name=""/>
+        <p:cNvGrpSpPr/>
+        <p:nvPr/>
+      </p:nvGrpSpPr>
+      <p:grpSpPr>
+        <a:xfrm>
+          <a:off x="0" y="0"/>
+          <a:ext cx="0" cy="0"/>
+          <a:chOff x="0" y="0"/>
+          <a:chExt cx="0" cy="0"/>
+        </a:xfrm>
+      </p:grpSpPr>
+      <p:sp>
+        <p:nvSpPr>
+          <p:cNvPr id="4" name="Slide Number Placeholder 3"/>
+          <p:cNvSpPr>
+            <a:spLocks noGrp="1"/>
+          </p:cNvSpPr>
+          <p:nvPr>
+            <p:ph type="sldNum" sz="quarter" idx="4294967295"/>
+          </p:nvPr>
+        </p:nvSpPr>
+        <p:spPr>
+          <a:xfrm>
+            <a:off x="7696200" y="6629400"/>
+            <a:ext cx="1447800" cy="228600"/>
+          </a:xfrm>
+          <a:prstGeom prst="rect">
+            <a:avLst/>
+          </a:prstGeom>
+        </p:spPr>
+        <p:txBody>
+          <a:bodyPr/>
+          <a:lstStyle/>
+          <a:p>
+            <a:pPr>
+              <a:defRPr/>
+            </a:pPr>
+            <a:r>
+              <a:rPr lang="en-US" dirty="0" err="1" smtClean="0"/>
+              <a:t>bayes</a:t>
+            </a:r>
+            <a:r>
+              <a:rPr lang="en-US" dirty="0" smtClean="0"/>
+              <a:t>.</a:t>
+            </a:r>
+            <a:fld id="{B9A0B45D-6AFD-413C-B761-B121FB8BE940}" type="slidenum">
+              <a:rPr lang="en-US" smtClean="0"/>
+              <a:pPr>
+                <a:defRPr/>
+              </a:pPr>
+              <a:t>36</a:t>
+            </a:fld>
+            <a:endParaRPr lang="en-US" dirty="0"/>
+          </a:p>
+        </p:txBody>
+      </p:sp>
+      <p:sp>
+        <p:nvSpPr>
+          <p:cNvPr id="6" name="TextBox 5"/>
+          <p:cNvSpPr txBox="1"/>
+          <p:nvPr/>
+        </p:nvSpPr>
+        <p:spPr>
+          <a:xfrm>
+            <a:off x="355568" y="1379277"/>
+            <a:ext cx="8114721" cy="1717393"/>
+          </a:xfrm>
+          <a:prstGeom prst="rect">
+            <a:avLst/>
+          </a:prstGeom>
+          <a:noFill/>
+        </p:spPr>
+        <p:txBody>
+          <a:bodyPr wrap="none" rtlCol="0">
+            <a:spAutoFit/>
+          </a:bodyPr>
+          <a:lstStyle/>
+          <a:p>
+            <a:pPr algn="l"/>
+            <a:r>
+              <a:rPr lang="en-US" sz="4800" dirty="0" smtClean="0">
+                <a:solidFill>
+                  <a:srgbClr val="0000CC"/>
+                </a:solidFill>
+                <a:latin typeface="Comic Sans MS"/>
+                <a:cs typeface="Comic Sans MS"/>
+              </a:rPr>
+              <a:t>98%</a:t>
+            </a:r>
+            <a:r>
+              <a:rPr lang="en-US" sz="4800" dirty="0" smtClean="0">
+                <a:latin typeface="Comic Sans MS"/>
+                <a:cs typeface="Comic Sans MS"/>
+              </a:rPr>
+              <a:t> </a:t>
+            </a:r>
+            <a:r>
+              <a:rPr lang="en-US" sz="4800" dirty="0">
+                <a:latin typeface="Comic Sans MS"/>
+                <a:cs typeface="Comic Sans MS"/>
+              </a:rPr>
+              <a:t>accurate </a:t>
+            </a:r>
+            <a:r>
+              <a:rPr lang="en-US" sz="4800" dirty="0" smtClean="0">
+                <a:latin typeface="Comic Sans MS"/>
+                <a:cs typeface="Comic Sans MS"/>
+              </a:rPr>
+              <a:t>test is not so</a:t>
+            </a:r>
+          </a:p>
+          <a:p>
+            <a:pPr algn="l"/>
+            <a:r>
+              <a:rPr lang="en-US" sz="4800" dirty="0" smtClean="0">
+                <a:latin typeface="Comic Sans MS"/>
+                <a:cs typeface="Comic Sans MS"/>
+              </a:rPr>
+              <a:t>good here.</a:t>
+            </a:r>
+          </a:p>
+        </p:txBody>
+      </p:sp>
+      <p:sp>
+        <p:nvSpPr>
+          <p:cNvPr id="7" name="Rectangle 4"/>
+          <p:cNvSpPr txBox="1">
+            <a:spLocks noChangeArrowheads="1"/>
+          </p:cNvSpPr>
+          <p:nvPr/>
+        </p:nvSpPr>
+        <p:spPr bwMode="auto">
+          <a:xfrm>
+            <a:off x="1447800" y="381000"/>
+            <a:ext cx="6553200" cy="838200"/>
+          </a:xfrm>
+          <a:prstGeom prst="rect">
+            <a:avLst/>
+          </a:prstGeom>
+          <a:noFill/>
+          <a:ln w="9525">
+            <a:noFill/>
+            <a:miter lim="800000"/>
+            <a:headEnd/>
+            <a:tailEnd/>
+          </a:ln>
+        </p:spPr>
+        <p:txBody>
+          <a:bodyPr vert="horz" wrap="square" lIns="91440" tIns="45720" rIns="91440" bIns="45720" numCol="1" anchor="ctr" anchorCtr="0" compatLnSpc="1">
+            <a:prstTxWarp prst="textNoShape">
+              <a:avLst/>
+            </a:prstTxWarp>
+          </a:bodyPr>
+          <a:lstStyle>
+            <a:lvl1pPr algn="ctr" rtl="0" eaLnBrk="0" fontAlgn="base" hangingPunct="0">
+              <a:spcBef>
+                <a:spcPct val="0"/>
+              </a:spcBef>
+              <a:spcAft>
+                <a:spcPct val="0"/>
+              </a:spcAft>
+              <a:defRPr sz="3200" b="1">
+                <a:solidFill>
+                  <a:schemeClr val="tx2"/>
+                </a:solidFill>
+                <a:latin typeface="+mj-lt"/>
+                <a:ea typeface="+mj-ea"/>
+                <a:cs typeface="+mj-cs"/>
+              </a:defRPr>
+            </a:lvl1pPr>
+            <a:lvl2pPr algn="ctr" rtl="0" eaLnBrk="0" fontAlgn="base" hangingPunct="0">
+              <a:spcBef>
+                <a:spcPct val="0"/>
+              </a:spcBef>
+              <a:spcAft>
+                <a:spcPct val="0"/>
+              </a:spcAft>
+              <a:defRPr sz="3600" b="1">
+                <a:solidFill>
+                  <a:schemeClr val="tx2"/>
+                </a:solidFill>
+                <a:latin typeface="Comic Sans MS" pitchFamily="66" charset="0"/>
+              </a:defRPr>
+            </a:lvl2pPr>
+            <a:lvl3pPr algn="ctr" rtl="0" eaLnBrk="0" fontAlgn="base" hangingPunct="0">
+              <a:spcBef>
+                <a:spcPct val="0"/>
+              </a:spcBef>
+              <a:spcAft>
+                <a:spcPct val="0"/>
+              </a:spcAft>
+              <a:defRPr sz="3600" b="1">
+                <a:solidFill>
+                  <a:schemeClr val="tx2"/>
+                </a:solidFill>
+                <a:latin typeface="Comic Sans MS" pitchFamily="66" charset="0"/>
+              </a:defRPr>
+            </a:lvl3pPr>
+            <a:lvl4pPr algn="ctr" rtl="0" eaLnBrk="0" fontAlgn="base" hangingPunct="0">
+              <a:spcBef>
+                <a:spcPct val="0"/>
+              </a:spcBef>
+              <a:spcAft>
+                <a:spcPct val="0"/>
+              </a:spcAft>
+              <a:defRPr sz="3600" b="1">
+                <a:solidFill>
+                  <a:schemeClr val="tx2"/>
+                </a:solidFill>
+                <a:latin typeface="Comic Sans MS" pitchFamily="66" charset="0"/>
+              </a:defRPr>
+            </a:lvl4pPr>
+            <a:lvl5pPr algn="ctr" rtl="0" eaLnBrk="0" fontAlgn="base" hangingPunct="0">
+              <a:spcBef>
+                <a:spcPct val="0"/>
+              </a:spcBef>
+              <a:spcAft>
+                <a:spcPct val="0"/>
+              </a:spcAft>
+              <a:defRPr sz="3600" b="1">
+                <a:solidFill>
+                  <a:schemeClr val="tx2"/>
+                </a:solidFill>
+                <a:latin typeface="Comic Sans MS" pitchFamily="66" charset="0"/>
+              </a:defRPr>
+            </a:lvl5pPr>
+            <a:lvl6pPr marL="457200" algn="ctr" rtl="0" fontAlgn="base">
+              <a:spcBef>
+                <a:spcPct val="0"/>
+              </a:spcBef>
+              <a:spcAft>
+                <a:spcPct val="0"/>
+              </a:spcAft>
+              <a:defRPr sz="3600" b="1">
+                <a:solidFill>
+                  <a:schemeClr val="tx2"/>
+                </a:solidFill>
+                <a:latin typeface="Comic Sans MS" pitchFamily="66" charset="0"/>
+              </a:defRPr>
+            </a:lvl6pPr>
+            <a:lvl7pPr marL="914400" algn="ctr" rtl="0" fontAlgn="base">
+              <a:spcBef>
+                <a:spcPct val="0"/>
+              </a:spcBef>
+              <a:spcAft>
+                <a:spcPct val="0"/>
+              </a:spcAft>
+              <a:defRPr sz="3600" b="1">
+                <a:solidFill>
+                  <a:schemeClr val="tx2"/>
+                </a:solidFill>
+                <a:latin typeface="Comic Sans MS" pitchFamily="66" charset="0"/>
+              </a:defRPr>
+            </a:lvl7pPr>
+            <a:lvl8pPr marL="1371600" algn="ctr" rtl="0" fontAlgn="base">
+              <a:spcBef>
+                <a:spcPct val="0"/>
+              </a:spcBef>
+              <a:spcAft>
+                <a:spcPct val="0"/>
+              </a:spcAft>
+              <a:defRPr sz="3600" b="1">
+                <a:solidFill>
+                  <a:schemeClr val="tx2"/>
+                </a:solidFill>
+                <a:latin typeface="Comic Sans MS" pitchFamily="66" charset="0"/>
+              </a:defRPr>
+            </a:lvl8pPr>
+            <a:lvl9pPr marL="1828800" algn="ctr" rtl="0" fontAlgn="base">
+              <a:spcBef>
+                <a:spcPct val="0"/>
+              </a:spcBef>
+              <a:spcAft>
+                <a:spcPct val="0"/>
+              </a:spcAft>
+              <a:defRPr sz="3600" b="1">
+                <a:solidFill>
+                  <a:schemeClr val="tx2"/>
+                </a:solidFill>
+                <a:latin typeface="Comic Sans MS" pitchFamily="66" charset="0"/>
+              </a:defRPr>
+            </a:lvl9pPr>
+          </a:lstStyle>
+          <a:p>
+            <a:pPr eaLnBrk="1" hangingPunct="1"/>
+            <a:r>
+              <a:rPr lang="en-US" sz="4400" dirty="0" smtClean="0">
+                <a:solidFill>
+                  <a:schemeClr val="tx1"/>
+                </a:solidFill>
+                <a:latin typeface="Comic Sans MS"/>
+                <a:cs typeface="Comic Sans MS"/>
+              </a:rPr>
+              <a:t>A “more accurate” test</a:t>
+            </a:r>
+          </a:p>
+        </p:txBody>
+      </p:sp>
+    </p:spTree>
+    <p:extLst>
+      <p:ext uri="{BB962C8B-B14F-4D97-AF65-F5344CB8AC3E}">
+        <p14:creationId xmlns:p14="http://schemas.microsoft.com/office/powerpoint/2010/main" val="1044690127"/>
+      </p:ext>
+    </p:extLst>
+  </p:cSld>
+  <p:clrMapOvr>
+    <a:masterClrMapping/>
+  </p:clrMapOvr>
+  <p:transition xmlns:p14="http://schemas.microsoft.com/office/powerpoint/2010/main" spd="slow" advClick="0">
+    <p:fade thruBlk="1"/>
+  </p:transition>
+  <p:timing>
+    <p:tnLst>
+      <p:par>
+        <p:cTn xmlns:p14="http://schemas.microsoft.com/office/powerpoint/2010/main" id="1" dur="indefinite" restart="never" nodeType="tmRoot"/>
+      </p:par>
+    </p:tnLst>
+  </p:timing>
+</p:sld>
+</file>
+
+<file path=ppt/slides/slide37.xml><?xml version="1.0" encoding="utf-8"?>
+<p:sld xmlns:a="http://schemas.openxmlformats.org/drawingml/2006/main" xmlns:r="http://schemas.openxmlformats.org/officeDocument/2006/relationships" xmlns:p="http://schemas.openxmlformats.org/presentationml/2006/main">
+  <p:cSld>
+    <p:spTree>
+      <p:nvGrpSpPr>
+        <p:cNvPr id="1" name=""/>
+        <p:cNvGrpSpPr/>
+        <p:nvPr/>
+      </p:nvGrpSpPr>
+      <p:grpSpPr>
+        <a:xfrm>
+          <a:off x="0" y="0"/>
+          <a:ext cx="0" cy="0"/>
+          <a:chOff x="0" y="0"/>
+          <a:chExt cx="0" cy="0"/>
+        </a:xfrm>
+      </p:grpSpPr>
+      <p:sp>
+        <p:nvSpPr>
+          <p:cNvPr id="6" name="TextBox 5"/>
+          <p:cNvSpPr txBox="1"/>
+          <p:nvPr/>
+        </p:nvSpPr>
+        <p:spPr>
+          <a:xfrm>
+            <a:off x="355568" y="1379277"/>
+            <a:ext cx="8234045" cy="4376583"/>
+          </a:xfrm>
+          <a:prstGeom prst="rect">
+            <a:avLst/>
+          </a:prstGeom>
+          <a:noFill/>
+        </p:spPr>
+        <p:txBody>
+          <a:bodyPr wrap="none" rtlCol="0">
+            <a:spAutoFit/>
+          </a:bodyPr>
+          <a:lstStyle/>
+          <a:p>
+            <a:pPr algn="l"/>
+            <a:r>
+              <a:rPr lang="en-US" sz="4800" dirty="0" smtClean="0">
+                <a:solidFill>
+                  <a:srgbClr val="0000CC"/>
+                </a:solidFill>
+                <a:latin typeface="Comic Sans MS"/>
+                <a:cs typeface="Comic Sans MS"/>
+              </a:rPr>
+              <a:t>98%</a:t>
+            </a:r>
+            <a:r>
+              <a:rPr lang="en-US" sz="4800" dirty="0" smtClean="0">
+                <a:latin typeface="Comic Sans MS"/>
+                <a:cs typeface="Comic Sans MS"/>
+              </a:rPr>
+              <a:t> </a:t>
+            </a:r>
+            <a:r>
+              <a:rPr lang="en-US" sz="4800" dirty="0">
+                <a:latin typeface="Comic Sans MS"/>
+                <a:cs typeface="Comic Sans MS"/>
+              </a:rPr>
+              <a:t>accurate </a:t>
+            </a:r>
+            <a:r>
+              <a:rPr lang="en-US" sz="4800" dirty="0" smtClean="0">
+                <a:latin typeface="Comic Sans MS"/>
+                <a:cs typeface="Comic Sans MS"/>
+              </a:rPr>
+              <a:t>test is not so</a:t>
+            </a:r>
+          </a:p>
+          <a:p>
+            <a:pPr algn="l"/>
+            <a:r>
+              <a:rPr lang="en-US" sz="4800" dirty="0" smtClean="0">
+                <a:latin typeface="Comic Sans MS"/>
+                <a:cs typeface="Comic Sans MS"/>
+              </a:rPr>
+              <a:t>good here.  In fact, there’s</a:t>
+            </a:r>
+          </a:p>
+          <a:p>
+            <a:pPr algn="l"/>
+            <a:r>
+              <a:rPr lang="en-US" sz="4800" dirty="0" smtClean="0">
+                <a:latin typeface="Comic Sans MS"/>
+                <a:cs typeface="Comic Sans MS"/>
+              </a:rPr>
+              <a:t>a trivial test that is </a:t>
+            </a:r>
+            <a:r>
+              <a:rPr lang="en-US" sz="4800" dirty="0" smtClean="0">
+                <a:solidFill>
+                  <a:srgbClr val="0000CC"/>
+                </a:solidFill>
+                <a:latin typeface="Comic Sans MS"/>
+                <a:cs typeface="Comic Sans MS"/>
+              </a:rPr>
+              <a:t>99.99%</a:t>
+            </a:r>
+          </a:p>
+          <a:p>
+            <a:pPr algn="l"/>
+            <a:r>
+              <a:rPr lang="en-US" sz="4800" dirty="0" smtClean="0">
+                <a:latin typeface="Comic Sans MS"/>
+                <a:cs typeface="Comic Sans MS"/>
+              </a:rPr>
+              <a:t>accurate:</a:t>
+            </a:r>
+          </a:p>
+          <a:p>
+            <a:pPr algn="l"/>
+            <a:r>
+              <a:rPr lang="en-US" sz="4800" dirty="0">
+                <a:latin typeface="Comic Sans MS"/>
+                <a:cs typeface="Comic Sans MS"/>
+              </a:rPr>
+              <a:t>	 </a:t>
+            </a:r>
+            <a:r>
+              <a:rPr lang="en-US" sz="4800" dirty="0" smtClean="0">
+                <a:latin typeface="Comic Sans MS"/>
+                <a:cs typeface="Comic Sans MS"/>
+              </a:rPr>
+              <a:t>   </a:t>
+            </a:r>
+            <a:r>
+              <a:rPr lang="en-US" sz="4800" dirty="0" smtClean="0">
+                <a:solidFill>
+                  <a:srgbClr val="8C0085"/>
+                </a:solidFill>
+                <a:latin typeface="Comic Sans MS"/>
+                <a:cs typeface="Comic Sans MS"/>
+              </a:rPr>
+              <a:t>always</a:t>
+            </a:r>
+            <a:r>
+              <a:rPr lang="en-US" sz="4800" dirty="0" smtClean="0">
+                <a:latin typeface="Comic Sans MS"/>
+                <a:cs typeface="Comic Sans MS"/>
+              </a:rPr>
+              <a:t> say “</a:t>
+            </a:r>
+            <a:r>
+              <a:rPr lang="en-US" sz="4800" dirty="0" smtClean="0">
+                <a:solidFill>
+                  <a:srgbClr val="8C0085"/>
+                </a:solidFill>
+                <a:latin typeface="Comic Sans MS"/>
+                <a:cs typeface="Comic Sans MS"/>
+              </a:rPr>
+              <a:t>No TB</a:t>
+            </a:r>
+            <a:r>
+              <a:rPr lang="en-US" sz="4800" dirty="0" smtClean="0">
+                <a:latin typeface="Comic Sans MS"/>
+                <a:cs typeface="Comic Sans MS"/>
+              </a:rPr>
+              <a:t>”</a:t>
+            </a:r>
+          </a:p>
+        </p:txBody>
+      </p:sp>
+      <p:sp>
+        <p:nvSpPr>
+          <p:cNvPr id="7" name="Rectangle 4"/>
+          <p:cNvSpPr txBox="1">
+            <a:spLocks noChangeArrowheads="1"/>
+          </p:cNvSpPr>
+          <p:nvPr/>
+        </p:nvSpPr>
+        <p:spPr bwMode="auto">
+          <a:xfrm>
+            <a:off x="1447800" y="381000"/>
+            <a:ext cx="6553200" cy="838200"/>
+          </a:xfrm>
+          <a:prstGeom prst="rect">
+            <a:avLst/>
+          </a:prstGeom>
+          <a:noFill/>
+          <a:ln w="9525">
+            <a:noFill/>
+            <a:miter lim="800000"/>
+            <a:headEnd/>
+            <a:tailEnd/>
+          </a:ln>
+        </p:spPr>
+        <p:txBody>
+          <a:bodyPr vert="horz" wrap="square" lIns="91440" tIns="45720" rIns="91440" bIns="45720" numCol="1" anchor="ctr" anchorCtr="0" compatLnSpc="1">
+            <a:prstTxWarp prst="textNoShape">
+              <a:avLst/>
+            </a:prstTxWarp>
+          </a:bodyPr>
+          <a:lstStyle>
+            <a:lvl1pPr algn="ctr" rtl="0" eaLnBrk="0" fontAlgn="base" hangingPunct="0">
+              <a:spcBef>
+                <a:spcPct val="0"/>
+              </a:spcBef>
+              <a:spcAft>
+                <a:spcPct val="0"/>
+              </a:spcAft>
+              <a:defRPr sz="3200" b="1">
+                <a:solidFill>
+                  <a:schemeClr val="tx2"/>
+                </a:solidFill>
+                <a:latin typeface="+mj-lt"/>
+                <a:ea typeface="+mj-ea"/>
+                <a:cs typeface="+mj-cs"/>
+              </a:defRPr>
+            </a:lvl1pPr>
+            <a:lvl2pPr algn="ctr" rtl="0" eaLnBrk="0" fontAlgn="base" hangingPunct="0">
+              <a:spcBef>
+                <a:spcPct val="0"/>
+              </a:spcBef>
+              <a:spcAft>
+                <a:spcPct val="0"/>
+              </a:spcAft>
+              <a:defRPr sz="3600" b="1">
+                <a:solidFill>
+                  <a:schemeClr val="tx2"/>
+                </a:solidFill>
+                <a:latin typeface="Comic Sans MS" pitchFamily="66" charset="0"/>
+              </a:defRPr>
+            </a:lvl2pPr>
+            <a:lvl3pPr algn="ctr" rtl="0" eaLnBrk="0" fontAlgn="base" hangingPunct="0">
+              <a:spcBef>
+                <a:spcPct val="0"/>
+              </a:spcBef>
+              <a:spcAft>
+                <a:spcPct val="0"/>
+              </a:spcAft>
+              <a:defRPr sz="3600" b="1">
+                <a:solidFill>
+                  <a:schemeClr val="tx2"/>
+                </a:solidFill>
+                <a:latin typeface="Comic Sans MS" pitchFamily="66" charset="0"/>
+              </a:defRPr>
+            </a:lvl3pPr>
+            <a:lvl4pPr algn="ctr" rtl="0" eaLnBrk="0" fontAlgn="base" hangingPunct="0">
+              <a:spcBef>
+                <a:spcPct val="0"/>
+              </a:spcBef>
+              <a:spcAft>
+                <a:spcPct val="0"/>
+              </a:spcAft>
+              <a:defRPr sz="3600" b="1">
+                <a:solidFill>
+                  <a:schemeClr val="tx2"/>
+                </a:solidFill>
+                <a:latin typeface="Comic Sans MS" pitchFamily="66" charset="0"/>
+              </a:defRPr>
+            </a:lvl4pPr>
+            <a:lvl5pPr algn="ctr" rtl="0" eaLnBrk="0" fontAlgn="base" hangingPunct="0">
+              <a:spcBef>
+                <a:spcPct val="0"/>
+              </a:spcBef>
+              <a:spcAft>
+                <a:spcPct val="0"/>
+              </a:spcAft>
+              <a:defRPr sz="3600" b="1">
+                <a:solidFill>
+                  <a:schemeClr val="tx2"/>
+                </a:solidFill>
+                <a:latin typeface="Comic Sans MS" pitchFamily="66" charset="0"/>
+              </a:defRPr>
+            </a:lvl5pPr>
+            <a:lvl6pPr marL="457200" algn="ctr" rtl="0" fontAlgn="base">
+              <a:spcBef>
+                <a:spcPct val="0"/>
+              </a:spcBef>
+              <a:spcAft>
+                <a:spcPct val="0"/>
+              </a:spcAft>
+              <a:defRPr sz="3600" b="1">
+                <a:solidFill>
+                  <a:schemeClr val="tx2"/>
+                </a:solidFill>
+                <a:latin typeface="Comic Sans MS" pitchFamily="66" charset="0"/>
+              </a:defRPr>
+            </a:lvl6pPr>
+            <a:lvl7pPr marL="914400" algn="ctr" rtl="0" fontAlgn="base">
+              <a:spcBef>
+                <a:spcPct val="0"/>
+              </a:spcBef>
+              <a:spcAft>
+                <a:spcPct val="0"/>
+              </a:spcAft>
+              <a:defRPr sz="3600" b="1">
+                <a:solidFill>
+                  <a:schemeClr val="tx2"/>
+                </a:solidFill>
+                <a:latin typeface="Comic Sans MS" pitchFamily="66" charset="0"/>
+              </a:defRPr>
+            </a:lvl7pPr>
+            <a:lvl8pPr marL="1371600" algn="ctr" rtl="0" fontAlgn="base">
+              <a:spcBef>
+                <a:spcPct val="0"/>
+              </a:spcBef>
+              <a:spcAft>
+                <a:spcPct val="0"/>
+              </a:spcAft>
+              <a:defRPr sz="3600" b="1">
+                <a:solidFill>
+                  <a:schemeClr val="tx2"/>
+                </a:solidFill>
+                <a:latin typeface="Comic Sans MS" pitchFamily="66" charset="0"/>
+              </a:defRPr>
+            </a:lvl8pPr>
+            <a:lvl9pPr marL="1828800" algn="ctr" rtl="0" fontAlgn="base">
+              <a:spcBef>
+                <a:spcPct val="0"/>
+              </a:spcBef>
+              <a:spcAft>
+                <a:spcPct val="0"/>
+              </a:spcAft>
+              <a:defRPr sz="3600" b="1">
+                <a:solidFill>
+                  <a:schemeClr val="tx2"/>
+                </a:solidFill>
+                <a:latin typeface="Comic Sans MS" pitchFamily="66" charset="0"/>
+              </a:defRPr>
+            </a:lvl9pPr>
+          </a:lstStyle>
+          <a:p>
+            <a:pPr eaLnBrk="1" hangingPunct="1"/>
+            <a:r>
+              <a:rPr lang="en-US" sz="4400" dirty="0" smtClean="0">
+                <a:solidFill>
+                  <a:schemeClr val="tx1"/>
+                </a:solidFill>
+                <a:latin typeface="Comic Sans MS"/>
+                <a:cs typeface="Comic Sans MS"/>
+              </a:rPr>
+              <a:t>A “more accurate” test</a:t>
+            </a:r>
+          </a:p>
+        </p:txBody>
+      </p:sp>
+      <p:sp>
+        <p:nvSpPr>
+          <p:cNvPr id="5" name="Rectangle 4"/>
+          <p:cNvSpPr txBox="1">
+            <a:spLocks noChangeArrowheads="1"/>
+          </p:cNvSpPr>
+          <p:nvPr/>
+        </p:nvSpPr>
+        <p:spPr bwMode="auto">
+          <a:xfrm>
+            <a:off x="7696200" y="6629400"/>
+            <a:ext cx="1447800" cy="228600"/>
+          </a:xfrm>
+          <a:prstGeom prst="rect">
+            <a:avLst/>
+          </a:prstGeom>
+          <a:noFill/>
+          <a:ln w="9525">
+            <a:noFill/>
+            <a:miter lim="800000"/>
+            <a:headEnd/>
+            <a:tailEnd/>
+          </a:ln>
+          <a:effectLst/>
+        </p:spPr>
+        <p:txBody>
+          <a:bodyPr vert="horz" wrap="square" lIns="91440" tIns="45720" rIns="91440" bIns="45720" numCol="1" anchor="t" anchorCtr="0" compatLnSpc="1">
+            <a:prstTxWarp prst="textNoShape">
+              <a:avLst/>
+            </a:prstTxWarp>
+          </a:bodyPr>
+          <a:lstStyle>
+            <a:lvl1pPr algn="r">
+              <a:defRPr sz="1200" dirty="0" err="1" smtClean="0">
+                <a:latin typeface="+mn-lt"/>
+              </a:defRPr>
+            </a:lvl1pPr>
+          </a:lstStyle>
+          <a:p>
+            <a:pPr marL="0" marR="0" lvl="0" indent="0" algn="r" defTabSz="914400" rtl="0" eaLnBrk="1" fontAlgn="base" latinLnBrk="0" hangingPunct="1">
+              <a:lnSpc>
+                <a:spcPct val="100000"/>
+              </a:lnSpc>
+              <a:spcBef>
+                <a:spcPct val="0"/>
+              </a:spcBef>
+              <a:spcAft>
+                <a:spcPct val="0"/>
+              </a:spcAft>
+              <a:buClrTx/>
+              <a:buSzTx/>
+              <a:buFontTx/>
+              <a:buNone/>
+              <a:tabLst/>
+              <a:defRPr/>
+            </a:pPr>
+            <a:r>
+              <a:rPr kumimoji="0" lang="en-US" sz="1200" b="0" i="0" u="none" strike="noStrike" kern="1200" cap="none" spc="0" normalizeH="0" baseline="0" noProof="0" dirty="0" smtClean="0">
+                <a:ln>
+                  <a:noFill/>
+                </a:ln>
+                <a:solidFill>
+                  <a:schemeClr val="tx1"/>
+                </a:solidFill>
+                <a:effectLst/>
+                <a:uLnTx/>
+                <a:uFillTx/>
+                <a:latin typeface="Comic Sans MS"/>
+                <a:ea typeface="+mn-ea"/>
+                <a:cs typeface="Comic Sans MS"/>
+              </a:rPr>
+              <a:t>testing.</a:t>
+            </a:r>
+            <a:fld id="{B9A0B45D-6AFD-413C-B761-B121FB8BE940}" type="slidenum">
+              <a:rPr kumimoji="0" lang="en-US" sz="1200" b="0" i="0" u="none" strike="noStrike" kern="1200" cap="none" spc="0" normalizeH="0" baseline="0" noProof="0" smtClean="0">
+                <a:ln>
+                  <a:noFill/>
+                </a:ln>
+                <a:solidFill>
+                  <a:schemeClr val="tx1"/>
+                </a:solidFill>
+                <a:effectLst/>
+                <a:uLnTx/>
+                <a:uFillTx/>
+                <a:latin typeface="Comic Sans MS"/>
+                <a:ea typeface="+mn-ea"/>
+                <a:cs typeface="Comic Sans MS"/>
+              </a:rPr>
+              <a:pPr marL="0" marR="0" lvl="0" indent="0" algn="r" defTabSz="914400" rtl="0" eaLnBrk="1" fontAlgn="base" latinLnBrk="0" hangingPunct="1">
+                <a:lnSpc>
+                  <a:spcPct val="100000"/>
+                </a:lnSpc>
+                <a:spcBef>
+                  <a:spcPct val="0"/>
+                </a:spcBef>
+                <a:spcAft>
+                  <a:spcPct val="0"/>
+                </a:spcAft>
+                <a:buClrTx/>
+                <a:buSzTx/>
+                <a:buFontTx/>
+                <a:buNone/>
+                <a:tabLst/>
+                <a:defRPr/>
+              </a:pPr>
+              <a:t>37</a:t>
+            </a:fld>
+            <a:endParaRPr kumimoji="0" lang="en-US" sz="1200" b="0" i="0" u="none" strike="noStrike" kern="1200" cap="none" spc="0" normalizeH="0" baseline="0" noProof="0" dirty="0">
+              <a:ln>
+                <a:noFill/>
+              </a:ln>
+              <a:solidFill>
+                <a:schemeClr val="tx1"/>
+              </a:solidFill>
+              <a:effectLst/>
+              <a:uLnTx/>
+              <a:uFillTx/>
+              <a:latin typeface="Comic Sans MS"/>
+              <a:ea typeface="+mn-ea"/>
+              <a:cs typeface="Comic Sans MS"/>
+            </a:endParaRPr>
+          </a:p>
+        </p:txBody>
+      </p:sp>
+    </p:spTree>
+    <p:extLst>
+      <p:ext uri="{BB962C8B-B14F-4D97-AF65-F5344CB8AC3E}">
+        <p14:creationId xmlns:p14="http://schemas.microsoft.com/office/powerpoint/2010/main" val="446529394"/>
+      </p:ext>
+    </p:extLst>
+  </p:cSld>
+  <p:clrMapOvr>
+    <a:masterClrMapping/>
+  </p:clrMapOvr>
+  <mc:AlternateContent xmlns:mc="http://schemas.openxmlformats.org/markup-compatibility/2006" xmlns:p14="http://schemas.microsoft.com/office/powerpoint/2010/main">
+    <mc:Choice Requires="p14">
+      <p:transition spd="med" p14:dur="700" advClick="0">
+        <p:fade/>
+      </p:transition>
+    </mc:Choice>
+    <mc:Fallback xmlns="">
+      <p:transition xmlns:p14="http://schemas.microsoft.com/office/powerpoint/2010/main" spd="med" advClick="0">
+        <p:fade/>
+      </p:transition>
+    </mc:Fallback>
+  </mc:AlternateContent>
+  <p:timing>
+    <p:tnLst>
+      <p:par>
+        <p:cTn xmlns:p14="http://schemas.microsoft.com/office/powerpoint/2010/main" id="1" dur="indefinite" restart="never" nodeType="tmRoot">
+          <p:childTnLst>
+            <p:seq concurrent="1" nextAc="seek">
+              <p:cTn id="2" dur="indefinite" nodeType="mainSeq">
+                <p:childTnLst>
+                  <p:par>
+                    <p:cTn id="3" fill="hold">
+                      <p:stCondLst>
+                        <p:cond delay="indefinite"/>
+                      </p:stCondLst>
+                      <p:childTnLst>
+                        <p:par>
+                          <p:cTn id="4" fill="hold">
+                            <p:stCondLst>
+                              <p:cond delay="0"/>
+                            </p:stCondLst>
+                            <p:childTnLst>
+                              <p:par>
+                                <p:cTn id="5" presetID="10" presetClass="entr" presetSubtype="0" fill="hold" nodeType="clickEffect">
+                                  <p:stCondLst>
+                                    <p:cond delay="0"/>
+                                  </p:stCondLst>
+                                  <p:childTnLst>
+                                    <p:set>
+                                      <p:cBhvr>
+                                        <p:cTn id="6" dur="1" fill="hold">
+                                          <p:stCondLst>
+                                            <p:cond delay="0"/>
+                                          </p:stCondLst>
+                                        </p:cTn>
+                                        <p:tgtEl>
+                                          <p:spTgt spid="6">
+                                            <p:txEl>
+                                              <p:pRg st="4" end="4"/>
+                                            </p:txEl>
+                                          </p:spTgt>
+                                        </p:tgtEl>
+                                        <p:attrNameLst>
+                                          <p:attrName>style.visibility</p:attrName>
+                                        </p:attrNameLst>
+                                      </p:cBhvr>
+                                      <p:to>
+                                        <p:strVal val="visible"/>
+                                      </p:to>
+                                    </p:set>
+                                    <p:animEffect transition="in" filter="fade">
+                                      <p:cBhvr>
+                                        <p:cTn id="7" dur="500"/>
+                                        <p:tgtEl>
+                                          <p:spTgt spid="6">
+                                            <p:txEl>
+                                              <p:pRg st="4" end="4"/>
+                                            </p:txEl>
+                                          </p:spTgt>
+                                        </p:tgtEl>
+                                      </p:cBhvr>
+                                    </p:animEffect>
+                                  </p:childTnLst>
+                                </p:cTn>
+                              </p:par>
+                            </p:childTnLst>
+                          </p:cTn>
+                        </p:par>
+                      </p:childTnLst>
+                    </p:cTn>
+                  </p:par>
+                </p:childTnLst>
+              </p:cTn>
+              <p:prevCondLst>
+                <p:cond evt="onPrev" delay="0">
+                  <p:tgtEl>
+                    <p:sldTgt/>
+                  </p:tgtEl>
+                </p:cond>
+              </p:prevCondLst>
+              <p:nextCondLst>
+                <p:cond evt="onNext" delay="0">
+                  <p:tgtEl>
+                    <p:sldTgt/>
+                  </p:tgtEl>
+                </p:cond>
+              </p:nextCondLst>
+            </p:seq>
+          </p:childTnLst>
+        </p:cTn>
+      </p:par>
+    </p:tnLst>
+  </p:timing>
+</p:sld>
+</file>
+
+<file path=ppt/slides/slide38.xml><?xml version="1.0" encoding="utf-8"?>
+<p:sld xmlns:a="http://schemas.openxmlformats.org/drawingml/2006/main" xmlns:r="http://schemas.openxmlformats.org/officeDocument/2006/relationships" xmlns:p="http://schemas.openxmlformats.org/presentationml/2006/main">
+  <p:cSld>
+    <p:spTree>
+      <p:nvGrpSpPr>
+        <p:cNvPr id="1" name=""/>
+        <p:cNvGrpSpPr/>
+        <p:nvPr/>
+      </p:nvGrpSpPr>
+      <p:grpSpPr>
+        <a:xfrm>
+          <a:off x="0" y="0"/>
+          <a:ext cx="0" cy="0"/>
+          <a:chOff x="0" y="0"/>
+          <a:chExt cx="0" cy="0"/>
+        </a:xfrm>
+      </p:grpSpPr>
+      <p:sp>
+        <p:nvSpPr>
+          <p:cNvPr id="6" name="TextBox 5"/>
+          <p:cNvSpPr txBox="1"/>
+          <p:nvPr/>
+        </p:nvSpPr>
+        <p:spPr>
+          <a:xfrm>
+            <a:off x="771480" y="1143000"/>
+            <a:ext cx="7365718" cy="2603790"/>
+          </a:xfrm>
+          <a:prstGeom prst="rect">
+            <a:avLst/>
+          </a:prstGeom>
+          <a:noFill/>
+        </p:spPr>
+        <p:txBody>
+          <a:bodyPr wrap="none" rtlCol="0">
+            <a:spAutoFit/>
+          </a:bodyPr>
+          <a:lstStyle/>
+          <a:p>
+            <a:pPr algn="l"/>
+            <a:r>
+              <a:rPr lang="en-US" sz="4800" dirty="0" smtClean="0">
+                <a:solidFill>
+                  <a:srgbClr val="0000CC"/>
+                </a:solidFill>
+                <a:latin typeface="Comic Sans MS"/>
+                <a:cs typeface="Comic Sans MS"/>
+              </a:rPr>
+              <a:t>98%</a:t>
+            </a:r>
+            <a:r>
+              <a:rPr lang="en-US" sz="4800" dirty="0" smtClean="0">
+                <a:latin typeface="Comic Sans MS"/>
+                <a:cs typeface="Comic Sans MS"/>
+              </a:rPr>
+              <a:t> </a:t>
+            </a:r>
+            <a:r>
+              <a:rPr lang="en-US" sz="4800" dirty="0">
+                <a:latin typeface="Comic Sans MS"/>
+                <a:cs typeface="Comic Sans MS"/>
+              </a:rPr>
+              <a:t>accurate </a:t>
+            </a:r>
+            <a:r>
+              <a:rPr lang="en-US" sz="4800" dirty="0" smtClean="0">
+                <a:latin typeface="Comic Sans MS"/>
+                <a:cs typeface="Comic Sans MS"/>
+              </a:rPr>
+              <a:t>test did</a:t>
+            </a:r>
+          </a:p>
+          <a:p>
+            <a:pPr algn="l"/>
+            <a:r>
+              <a:rPr lang="en-US" sz="4800" dirty="0" smtClean="0">
+                <a:latin typeface="Comic Sans MS"/>
+                <a:cs typeface="Comic Sans MS"/>
+              </a:rPr>
+              <a:t>increase your </a:t>
+            </a:r>
+            <a:r>
+              <a:rPr lang="en-US" sz="4800" dirty="0" smtClean="0">
+                <a:latin typeface="Comic Sans MS"/>
+                <a:cs typeface="Comic Sans MS"/>
+              </a:rPr>
+              <a:t>odds</a:t>
+            </a:r>
+            <a:r>
+              <a:rPr lang="en-US" sz="4800" dirty="0">
+                <a:latin typeface="Comic Sans MS"/>
+                <a:cs typeface="Comic Sans MS"/>
+              </a:rPr>
+              <a:t> </a:t>
+            </a:r>
+            <a:r>
+              <a:rPr lang="en-US" sz="4800" dirty="0" smtClean="0">
+                <a:latin typeface="Comic Sans MS"/>
+                <a:cs typeface="Comic Sans MS"/>
+              </a:rPr>
+              <a:t>of </a:t>
+            </a:r>
+            <a:r>
+              <a:rPr lang="en-US" sz="4800" dirty="0" smtClean="0">
+                <a:latin typeface="Comic Sans MS"/>
+                <a:cs typeface="Comic Sans MS"/>
+              </a:rPr>
+              <a:t>TB </a:t>
+            </a:r>
+            <a:endParaRPr lang="en-US" sz="4800" dirty="0" smtClean="0">
+              <a:latin typeface="Comic Sans MS"/>
+              <a:cs typeface="Comic Sans MS"/>
+            </a:endParaRPr>
+          </a:p>
+          <a:p>
+            <a:r>
+              <a:rPr lang="en-US" sz="4800" dirty="0" smtClean="0">
+                <a:solidFill>
+                  <a:srgbClr val="0000FF"/>
+                </a:solidFill>
+                <a:latin typeface="Comic Sans MS"/>
+                <a:cs typeface="Comic Sans MS"/>
+              </a:rPr>
+              <a:t>5</a:t>
+            </a:r>
+            <a:r>
+              <a:rPr lang="en-US" sz="4800" dirty="0" smtClean="0">
+                <a:solidFill>
+                  <a:srgbClr val="0000FF"/>
+                </a:solidFill>
+                <a:latin typeface="Comic Sans MS"/>
+                <a:cs typeface="Comic Sans MS"/>
+              </a:rPr>
+              <a:t>0</a:t>
+            </a:r>
+            <a:r>
+              <a:rPr lang="en-US" sz="4800" dirty="0" smtClean="0">
+                <a:latin typeface="Comic Sans MS"/>
+                <a:cs typeface="Comic Sans MS"/>
+              </a:rPr>
+              <a:t> </a:t>
+            </a:r>
+            <a:r>
+              <a:rPr lang="en-US" sz="4800" dirty="0" smtClean="0">
+                <a:latin typeface="Comic Sans MS"/>
+                <a:cs typeface="Comic Sans MS"/>
+              </a:rPr>
+              <a:t>times</a:t>
+            </a:r>
+            <a:r>
+              <a:rPr lang="en-US" sz="4800" dirty="0" smtClean="0">
+                <a:latin typeface="Comic Sans MS"/>
+                <a:cs typeface="Comic Sans MS"/>
+              </a:rPr>
+              <a:t>.</a:t>
+            </a:r>
+            <a:endParaRPr lang="en-US" sz="4800" dirty="0" smtClean="0">
+              <a:latin typeface="Comic Sans MS"/>
+              <a:cs typeface="Comic Sans MS"/>
+            </a:endParaRPr>
+          </a:p>
+        </p:txBody>
+      </p:sp>
+      <p:sp>
+        <p:nvSpPr>
+          <p:cNvPr id="7" name="Rectangle 4"/>
+          <p:cNvSpPr txBox="1">
+            <a:spLocks noChangeArrowheads="1"/>
+          </p:cNvSpPr>
+          <p:nvPr/>
+        </p:nvSpPr>
+        <p:spPr bwMode="auto">
+          <a:xfrm>
+            <a:off x="1355099" y="152400"/>
+            <a:ext cx="7266290" cy="1112484"/>
+          </a:xfrm>
+          <a:prstGeom prst="rect">
+            <a:avLst/>
+          </a:prstGeom>
+          <a:noFill/>
+          <a:ln w="9525">
+            <a:noFill/>
+            <a:miter lim="800000"/>
+            <a:headEnd/>
+            <a:tailEnd/>
+          </a:ln>
+        </p:spPr>
+        <p:txBody>
+          <a:bodyPr vert="horz" wrap="square" lIns="91440" tIns="45720" rIns="91440" bIns="45720" numCol="1" anchor="ctr" anchorCtr="0" compatLnSpc="1">
+            <a:prstTxWarp prst="textNoShape">
+              <a:avLst/>
+            </a:prstTxWarp>
+          </a:bodyPr>
+          <a:lstStyle>
+            <a:lvl1pPr algn="ctr" rtl="0" eaLnBrk="0" fontAlgn="base" hangingPunct="0">
+              <a:spcBef>
+                <a:spcPct val="0"/>
+              </a:spcBef>
+              <a:spcAft>
+                <a:spcPct val="0"/>
+              </a:spcAft>
+              <a:defRPr sz="3200" b="1">
+                <a:solidFill>
+                  <a:schemeClr val="tx2"/>
+                </a:solidFill>
+                <a:latin typeface="+mj-lt"/>
+                <a:ea typeface="+mj-ea"/>
+                <a:cs typeface="+mj-cs"/>
+              </a:defRPr>
+            </a:lvl1pPr>
+            <a:lvl2pPr algn="ctr" rtl="0" eaLnBrk="0" fontAlgn="base" hangingPunct="0">
+              <a:spcBef>
+                <a:spcPct val="0"/>
+              </a:spcBef>
+              <a:spcAft>
+                <a:spcPct val="0"/>
+              </a:spcAft>
+              <a:defRPr sz="3600" b="1">
+                <a:solidFill>
+                  <a:schemeClr val="tx2"/>
+                </a:solidFill>
+                <a:latin typeface="Comic Sans MS" pitchFamily="66" charset="0"/>
+              </a:defRPr>
+            </a:lvl2pPr>
+            <a:lvl3pPr algn="ctr" rtl="0" eaLnBrk="0" fontAlgn="base" hangingPunct="0">
+              <a:spcBef>
+                <a:spcPct val="0"/>
+              </a:spcBef>
+              <a:spcAft>
+                <a:spcPct val="0"/>
+              </a:spcAft>
+              <a:defRPr sz="3600" b="1">
+                <a:solidFill>
+                  <a:schemeClr val="tx2"/>
+                </a:solidFill>
+                <a:latin typeface="Comic Sans MS" pitchFamily="66" charset="0"/>
+              </a:defRPr>
+            </a:lvl3pPr>
+            <a:lvl4pPr algn="ctr" rtl="0" eaLnBrk="0" fontAlgn="base" hangingPunct="0">
+              <a:spcBef>
+                <a:spcPct val="0"/>
+              </a:spcBef>
+              <a:spcAft>
+                <a:spcPct val="0"/>
+              </a:spcAft>
+              <a:defRPr sz="3600" b="1">
+                <a:solidFill>
+                  <a:schemeClr val="tx2"/>
+                </a:solidFill>
+                <a:latin typeface="Comic Sans MS" pitchFamily="66" charset="0"/>
+              </a:defRPr>
+            </a:lvl4pPr>
+            <a:lvl5pPr algn="ctr" rtl="0" eaLnBrk="0" fontAlgn="base" hangingPunct="0">
+              <a:spcBef>
+                <a:spcPct val="0"/>
+              </a:spcBef>
+              <a:spcAft>
+                <a:spcPct val="0"/>
+              </a:spcAft>
+              <a:defRPr sz="3600" b="1">
+                <a:solidFill>
+                  <a:schemeClr val="tx2"/>
+                </a:solidFill>
+                <a:latin typeface="Comic Sans MS" pitchFamily="66" charset="0"/>
+              </a:defRPr>
+            </a:lvl5pPr>
+            <a:lvl6pPr marL="457200" algn="ctr" rtl="0" fontAlgn="base">
+              <a:spcBef>
+                <a:spcPct val="0"/>
+              </a:spcBef>
+              <a:spcAft>
+                <a:spcPct val="0"/>
+              </a:spcAft>
+              <a:defRPr sz="3600" b="1">
+                <a:solidFill>
+                  <a:schemeClr val="tx2"/>
+                </a:solidFill>
+                <a:latin typeface="Comic Sans MS" pitchFamily="66" charset="0"/>
+              </a:defRPr>
+            </a:lvl6pPr>
+            <a:lvl7pPr marL="914400" algn="ctr" rtl="0" fontAlgn="base">
+              <a:spcBef>
+                <a:spcPct val="0"/>
+              </a:spcBef>
+              <a:spcAft>
+                <a:spcPct val="0"/>
+              </a:spcAft>
+              <a:defRPr sz="3600" b="1">
+                <a:solidFill>
+                  <a:schemeClr val="tx2"/>
+                </a:solidFill>
+                <a:latin typeface="Comic Sans MS" pitchFamily="66" charset="0"/>
+              </a:defRPr>
+            </a:lvl7pPr>
+            <a:lvl8pPr marL="1371600" algn="ctr" rtl="0" fontAlgn="base">
+              <a:spcBef>
+                <a:spcPct val="0"/>
+              </a:spcBef>
+              <a:spcAft>
+                <a:spcPct val="0"/>
+              </a:spcAft>
+              <a:defRPr sz="3600" b="1">
+                <a:solidFill>
+                  <a:schemeClr val="tx2"/>
+                </a:solidFill>
+                <a:latin typeface="Comic Sans MS" pitchFamily="66" charset="0"/>
+              </a:defRPr>
+            </a:lvl8pPr>
+            <a:lvl9pPr marL="1828800" algn="ctr" rtl="0" fontAlgn="base">
+              <a:spcBef>
+                <a:spcPct val="0"/>
+              </a:spcBef>
+              <a:spcAft>
+                <a:spcPct val="0"/>
+              </a:spcAft>
+              <a:defRPr sz="3600" b="1">
+                <a:solidFill>
+                  <a:schemeClr val="tx2"/>
+                </a:solidFill>
+                <a:latin typeface="Comic Sans MS" pitchFamily="66" charset="0"/>
+              </a:defRPr>
+            </a:lvl9pPr>
+          </a:lstStyle>
+          <a:p>
+            <a:pPr eaLnBrk="1" hangingPunct="1"/>
+            <a:r>
+              <a:rPr lang="en-US" sz="4400" dirty="0" smtClean="0">
+                <a:solidFill>
+                  <a:schemeClr val="tx1"/>
+                </a:solidFill>
+                <a:latin typeface="Comic Sans MS"/>
+                <a:cs typeface="Comic Sans MS"/>
+              </a:rPr>
+              <a:t>98% </a:t>
+            </a:r>
+            <a:r>
+              <a:rPr lang="en-US" sz="4400" dirty="0" smtClean="0">
+                <a:solidFill>
+                  <a:schemeClr val="tx1"/>
+                </a:solidFill>
+                <a:latin typeface="Comic Sans MS"/>
+                <a:cs typeface="Comic Sans MS"/>
+              </a:rPr>
+              <a:t>accuracy still useful</a:t>
+            </a:r>
+          </a:p>
+        </p:txBody>
+      </p:sp>
+      <p:sp>
+        <p:nvSpPr>
+          <p:cNvPr id="5" name="Rectangle 4"/>
+          <p:cNvSpPr txBox="1">
+            <a:spLocks noChangeArrowheads="1"/>
+          </p:cNvSpPr>
+          <p:nvPr/>
+        </p:nvSpPr>
+        <p:spPr bwMode="auto">
+          <a:xfrm>
+            <a:off x="7696200" y="6629400"/>
+            <a:ext cx="1447800" cy="228600"/>
+          </a:xfrm>
+          <a:prstGeom prst="rect">
+            <a:avLst/>
+          </a:prstGeom>
+          <a:noFill/>
+          <a:ln w="9525">
+            <a:noFill/>
+            <a:miter lim="800000"/>
+            <a:headEnd/>
+            <a:tailEnd/>
+          </a:ln>
+          <a:effectLst/>
+        </p:spPr>
+        <p:txBody>
+          <a:bodyPr vert="horz" wrap="square" lIns="91440" tIns="45720" rIns="91440" bIns="45720" numCol="1" anchor="t" anchorCtr="0" compatLnSpc="1">
+            <a:prstTxWarp prst="textNoShape">
+              <a:avLst/>
+            </a:prstTxWarp>
+          </a:bodyPr>
+          <a:lstStyle>
+            <a:lvl1pPr algn="r">
+              <a:defRPr sz="1200" dirty="0" err="1" smtClean="0">
+                <a:latin typeface="+mn-lt"/>
+              </a:defRPr>
+            </a:lvl1pPr>
+          </a:lstStyle>
+          <a:p>
+            <a:pPr marL="0" marR="0" lvl="0" indent="0" algn="r" defTabSz="914400" rtl="0" eaLnBrk="1" fontAlgn="base" latinLnBrk="0" hangingPunct="1">
+              <a:lnSpc>
+                <a:spcPct val="100000"/>
+              </a:lnSpc>
+              <a:spcBef>
+                <a:spcPct val="0"/>
+              </a:spcBef>
+              <a:spcAft>
+                <a:spcPct val="0"/>
+              </a:spcAft>
+              <a:buClrTx/>
+              <a:buSzTx/>
+              <a:buFontTx/>
+              <a:buNone/>
+              <a:tabLst/>
+              <a:defRPr/>
+            </a:pPr>
+            <a:r>
+              <a:rPr kumimoji="0" lang="en-US" sz="1200" b="0" i="0" u="none" strike="noStrike" kern="1200" cap="none" spc="0" normalizeH="0" baseline="0" noProof="0" dirty="0" smtClean="0">
+                <a:ln>
+                  <a:noFill/>
+                </a:ln>
+                <a:solidFill>
+                  <a:schemeClr val="tx1"/>
+                </a:solidFill>
+                <a:effectLst/>
+                <a:uLnTx/>
+                <a:uFillTx/>
+                <a:latin typeface="Comic Sans MS"/>
+                <a:ea typeface="+mn-ea"/>
+                <a:cs typeface="Comic Sans MS"/>
+              </a:rPr>
+              <a:t>testing.</a:t>
+            </a:r>
+            <a:fld id="{B9A0B45D-6AFD-413C-B761-B121FB8BE940}" type="slidenum">
+              <a:rPr kumimoji="0" lang="en-US" sz="1200" b="0" i="0" u="none" strike="noStrike" kern="1200" cap="none" spc="0" normalizeH="0" baseline="0" noProof="0" smtClean="0">
+                <a:ln>
+                  <a:noFill/>
+                </a:ln>
+                <a:solidFill>
+                  <a:schemeClr val="tx1"/>
+                </a:solidFill>
+                <a:effectLst/>
+                <a:uLnTx/>
+                <a:uFillTx/>
+                <a:latin typeface="Comic Sans MS"/>
+                <a:ea typeface="+mn-ea"/>
+                <a:cs typeface="Comic Sans MS"/>
+              </a:rPr>
+              <a:pPr marL="0" marR="0" lvl="0" indent="0" algn="r" defTabSz="914400" rtl="0" eaLnBrk="1" fontAlgn="base" latinLnBrk="0" hangingPunct="1">
+                <a:lnSpc>
+                  <a:spcPct val="100000"/>
+                </a:lnSpc>
+                <a:spcBef>
+                  <a:spcPct val="0"/>
+                </a:spcBef>
+                <a:spcAft>
+                  <a:spcPct val="0"/>
+                </a:spcAft>
+                <a:buClrTx/>
+                <a:buSzTx/>
+                <a:buFontTx/>
+                <a:buNone/>
+                <a:tabLst/>
+                <a:defRPr/>
+              </a:pPr>
+              <a:t>38</a:t>
+            </a:fld>
+            <a:endParaRPr kumimoji="0" lang="en-US" sz="1200" b="0" i="0" u="none" strike="noStrike" kern="1200" cap="none" spc="0" normalizeH="0" baseline="0" noProof="0" dirty="0">
+              <a:ln>
+                <a:noFill/>
+              </a:ln>
+              <a:solidFill>
+                <a:schemeClr val="tx1"/>
+              </a:solidFill>
+              <a:effectLst/>
+              <a:uLnTx/>
+              <a:uFillTx/>
+              <a:latin typeface="Comic Sans MS"/>
+              <a:ea typeface="+mn-ea"/>
+              <a:cs typeface="Comic Sans MS"/>
+            </a:endParaRPr>
+          </a:p>
+        </p:txBody>
+      </p:sp>
+    </p:spTree>
+    <p:extLst>
+      <p:ext uri="{BB962C8B-B14F-4D97-AF65-F5344CB8AC3E}">
+        <p14:creationId xmlns:p14="http://schemas.microsoft.com/office/powerpoint/2010/main" val="2266190519"/>
+      </p:ext>
+    </p:extLst>
+  </p:cSld>
+  <p:clrMapOvr>
+    <a:masterClrMapping/>
+  </p:clrMapOvr>
+  <p:transition xmlns:p14="http://schemas.microsoft.com/office/powerpoint/2010/main" spd="slow" advClick="0">
+    <p:fade thruBlk="1"/>
+  </p:transition>
+  <p:timing>
+    <p:tnLst>
+      <p:par>
+        <p:cTn xmlns:p14="http://schemas.microsoft.com/office/powerpoint/2010/main" id="1" dur="indefinite" restart="never" nodeType="tmRoot"/>
+      </p:par>
+    </p:tnLst>
+  </p:timing>
+</p:sld>
+</file>
+
+<file path=ppt/slides/slide39.xml><?xml version="1.0" encoding="utf-8"?>
+<p:sld xmlns:a="http://schemas.openxmlformats.org/drawingml/2006/main" xmlns:r="http://schemas.openxmlformats.org/officeDocument/2006/relationships" xmlns:p="http://schemas.openxmlformats.org/presentationml/2006/main">
+  <p:cSld>
+    <p:spTree>
+      <p:nvGrpSpPr>
+        <p:cNvPr id="1" name=""/>
+        <p:cNvGrpSpPr/>
+        <p:nvPr/>
+      </p:nvGrpSpPr>
+      <p:grpSpPr>
+        <a:xfrm>
+          <a:off x="0" y="0"/>
+          <a:ext cx="0" cy="0"/>
+          <a:chOff x="0" y="0"/>
+          <a:chExt cx="0" cy="0"/>
+        </a:xfrm>
+      </p:grpSpPr>
+      <p:sp>
+        <p:nvSpPr>
+          <p:cNvPr id="6" name="TextBox 5"/>
+          <p:cNvSpPr txBox="1"/>
+          <p:nvPr/>
+        </p:nvSpPr>
+        <p:spPr>
+          <a:xfrm>
+            <a:off x="771480" y="1143000"/>
+            <a:ext cx="7686720" cy="6149375"/>
+          </a:xfrm>
+          <a:prstGeom prst="rect">
+            <a:avLst/>
+          </a:prstGeom>
+          <a:noFill/>
+        </p:spPr>
+        <p:txBody>
+          <a:bodyPr wrap="none" rtlCol="0">
+            <a:spAutoFit/>
+          </a:bodyPr>
+          <a:lstStyle/>
+          <a:p>
+            <a:pPr algn="l"/>
+            <a:r>
+              <a:rPr lang="en-US" sz="4800" dirty="0" smtClean="0">
+                <a:solidFill>
+                  <a:srgbClr val="0000CC"/>
+                </a:solidFill>
+                <a:latin typeface="Comic Sans MS"/>
+                <a:cs typeface="Comic Sans MS"/>
+              </a:rPr>
+              <a:t>98%</a:t>
+            </a:r>
+            <a:r>
+              <a:rPr lang="en-US" sz="4800" dirty="0" smtClean="0">
+                <a:latin typeface="Comic Sans MS"/>
+                <a:cs typeface="Comic Sans MS"/>
+              </a:rPr>
+              <a:t> </a:t>
+            </a:r>
+            <a:r>
+              <a:rPr lang="en-US" sz="4800" dirty="0">
+                <a:latin typeface="Comic Sans MS"/>
+                <a:cs typeface="Comic Sans MS"/>
+              </a:rPr>
+              <a:t>accurate </a:t>
+            </a:r>
+            <a:r>
+              <a:rPr lang="en-US" sz="4800" dirty="0" smtClean="0">
+                <a:latin typeface="Comic Sans MS"/>
+                <a:cs typeface="Comic Sans MS"/>
+              </a:rPr>
+              <a:t>test did</a:t>
+            </a:r>
+          </a:p>
+          <a:p>
+            <a:pPr algn="l"/>
+            <a:r>
+              <a:rPr lang="en-US" sz="4800" dirty="0" smtClean="0">
+                <a:latin typeface="Comic Sans MS"/>
+                <a:cs typeface="Comic Sans MS"/>
+              </a:rPr>
+              <a:t>increase your </a:t>
+            </a:r>
+            <a:r>
+              <a:rPr lang="en-US" sz="4800" dirty="0" smtClean="0">
+                <a:latin typeface="Comic Sans MS"/>
+                <a:cs typeface="Comic Sans MS"/>
+              </a:rPr>
+              <a:t>odds</a:t>
+            </a:r>
+            <a:r>
+              <a:rPr lang="en-US" sz="4800" dirty="0">
+                <a:latin typeface="Comic Sans MS"/>
+                <a:cs typeface="Comic Sans MS"/>
+              </a:rPr>
+              <a:t> </a:t>
+            </a:r>
+            <a:r>
+              <a:rPr lang="en-US" sz="4800" dirty="0" smtClean="0">
+                <a:latin typeface="Comic Sans MS"/>
+                <a:cs typeface="Comic Sans MS"/>
+              </a:rPr>
+              <a:t>of </a:t>
+            </a:r>
+            <a:r>
+              <a:rPr lang="en-US" sz="4800" dirty="0" smtClean="0">
+                <a:latin typeface="Comic Sans MS"/>
+                <a:cs typeface="Comic Sans MS"/>
+              </a:rPr>
+              <a:t>TB </a:t>
+            </a:r>
+            <a:endParaRPr lang="en-US" sz="4800" dirty="0" smtClean="0">
+              <a:latin typeface="Comic Sans MS"/>
+              <a:cs typeface="Comic Sans MS"/>
+            </a:endParaRPr>
+          </a:p>
+          <a:p>
+            <a:r>
+              <a:rPr lang="en-US" sz="4800" dirty="0" smtClean="0">
+                <a:solidFill>
+                  <a:srgbClr val="0000FF"/>
+                </a:solidFill>
+                <a:latin typeface="Comic Sans MS"/>
+                <a:cs typeface="Comic Sans MS"/>
+              </a:rPr>
+              <a:t>5</a:t>
+            </a:r>
+            <a:r>
+              <a:rPr lang="en-US" sz="4800" dirty="0" smtClean="0">
+                <a:solidFill>
+                  <a:srgbClr val="0000FF"/>
+                </a:solidFill>
+                <a:latin typeface="Comic Sans MS"/>
+                <a:cs typeface="Comic Sans MS"/>
+              </a:rPr>
+              <a:t>0</a:t>
+            </a:r>
+            <a:r>
+              <a:rPr lang="en-US" sz="4800" dirty="0" smtClean="0">
+                <a:latin typeface="Comic Sans MS"/>
+                <a:cs typeface="Comic Sans MS"/>
+              </a:rPr>
+              <a:t> </a:t>
+            </a:r>
+            <a:r>
+              <a:rPr lang="en-US" sz="4800" dirty="0" smtClean="0">
+                <a:latin typeface="Comic Sans MS"/>
+                <a:cs typeface="Comic Sans MS"/>
+              </a:rPr>
+              <a:t>times</a:t>
+            </a:r>
+            <a:r>
+              <a:rPr lang="en-US" sz="4800" dirty="0">
+                <a:latin typeface="Comic Sans MS"/>
+                <a:cs typeface="Comic Sans MS"/>
+              </a:rPr>
+              <a:t>.  </a:t>
+            </a:r>
+            <a:r>
+              <a:rPr lang="en-US" sz="4800" dirty="0" smtClean="0">
+                <a:latin typeface="Comic Sans MS"/>
+                <a:cs typeface="Comic Sans MS"/>
+              </a:rPr>
+              <a:t>If you only </a:t>
+            </a:r>
+            <a:r>
+              <a:rPr lang="en-US" sz="4800" dirty="0">
+                <a:latin typeface="Comic Sans MS"/>
+                <a:cs typeface="Comic Sans MS"/>
+              </a:rPr>
+              <a:t>had </a:t>
+            </a:r>
+            <a:endParaRPr lang="en-US" sz="4800" dirty="0" smtClean="0">
+              <a:latin typeface="Comic Sans MS"/>
+              <a:cs typeface="Comic Sans MS"/>
+            </a:endParaRPr>
+          </a:p>
+          <a:p>
+            <a:r>
+              <a:rPr lang="en-US" sz="4800" dirty="0" smtClean="0">
+                <a:solidFill>
+                  <a:schemeClr val="accent1">
+                    <a:lumMod val="50000"/>
+                  </a:schemeClr>
+                </a:solidFill>
+                <a:latin typeface="Comic Sans MS"/>
+                <a:cs typeface="Comic Sans MS"/>
+              </a:rPr>
+              <a:t>7M</a:t>
+            </a:r>
+            <a:r>
+              <a:rPr lang="en-US" sz="4800" dirty="0" smtClean="0">
+                <a:latin typeface="Comic Sans MS"/>
+                <a:cs typeface="Comic Sans MS"/>
+              </a:rPr>
+              <a:t> </a:t>
+            </a:r>
+            <a:r>
+              <a:rPr lang="en-US" sz="4800" dirty="0">
+                <a:latin typeface="Comic Sans MS"/>
+                <a:cs typeface="Comic Sans MS"/>
+              </a:rPr>
+              <a:t>medicine </a:t>
+            </a:r>
+            <a:r>
+              <a:rPr lang="en-US" sz="4800" dirty="0" smtClean="0">
+                <a:latin typeface="Comic Sans MS"/>
+                <a:cs typeface="Comic Sans MS"/>
+              </a:rPr>
+              <a:t>doses for </a:t>
+            </a:r>
+            <a:r>
+              <a:rPr lang="en-US" sz="4800" dirty="0">
+                <a:latin typeface="Comic Sans MS"/>
+                <a:cs typeface="Comic Sans MS"/>
+              </a:rPr>
+              <a:t>a </a:t>
+            </a:r>
+            <a:endParaRPr lang="en-US" sz="4800" dirty="0" smtClean="0">
+              <a:latin typeface="Comic Sans MS"/>
+              <a:cs typeface="Comic Sans MS"/>
+            </a:endParaRPr>
+          </a:p>
+          <a:p>
+            <a:r>
+              <a:rPr lang="en-US" sz="4800" dirty="0" smtClean="0">
+                <a:latin typeface="Comic Sans MS"/>
+                <a:cs typeface="Comic Sans MS"/>
+              </a:rPr>
+              <a:t>population </a:t>
+            </a:r>
+            <a:r>
+              <a:rPr lang="en-US" sz="4800" dirty="0">
+                <a:latin typeface="Comic Sans MS"/>
+                <a:cs typeface="Comic Sans MS"/>
+              </a:rPr>
+              <a:t>of </a:t>
+            </a:r>
+            <a:r>
+              <a:rPr lang="en-US" sz="4800" dirty="0">
+                <a:solidFill>
+                  <a:srgbClr val="3333CC"/>
+                </a:solidFill>
+                <a:latin typeface="Comic Sans MS"/>
+                <a:cs typeface="Comic Sans MS"/>
+              </a:rPr>
+              <a:t>350M</a:t>
+            </a:r>
+            <a:r>
+              <a:rPr lang="en-US" sz="4800" dirty="0" smtClean="0">
+                <a:latin typeface="Comic Sans MS"/>
+                <a:cs typeface="Comic Sans MS"/>
+              </a:rPr>
+              <a:t>, whom</a:t>
+            </a:r>
+          </a:p>
+          <a:p>
+            <a:r>
+              <a:rPr lang="en-US" sz="4800" dirty="0" smtClean="0">
+                <a:latin typeface="Comic Sans MS"/>
+                <a:cs typeface="Comic Sans MS"/>
+              </a:rPr>
+              <a:t>should </a:t>
+            </a:r>
+            <a:r>
+              <a:rPr lang="en-US" sz="4800" dirty="0">
+                <a:latin typeface="Comic Sans MS"/>
+                <a:cs typeface="Comic Sans MS"/>
+              </a:rPr>
+              <a:t>you medicate?</a:t>
+            </a:r>
+          </a:p>
+          <a:p>
+            <a:pPr algn="l"/>
+            <a:endParaRPr lang="en-US" sz="4800" dirty="0" smtClean="0">
+              <a:latin typeface="Comic Sans MS"/>
+              <a:cs typeface="Comic Sans MS"/>
+            </a:endParaRPr>
+          </a:p>
+        </p:txBody>
+      </p:sp>
+      <p:sp>
+        <p:nvSpPr>
+          <p:cNvPr id="5" name="Rectangle 4"/>
+          <p:cNvSpPr txBox="1">
+            <a:spLocks noChangeArrowheads="1"/>
+          </p:cNvSpPr>
+          <p:nvPr/>
+        </p:nvSpPr>
+        <p:spPr bwMode="auto">
+          <a:xfrm>
+            <a:off x="7696200" y="6629400"/>
+            <a:ext cx="1447800" cy="228600"/>
+          </a:xfrm>
+          <a:prstGeom prst="rect">
+            <a:avLst/>
+          </a:prstGeom>
+          <a:noFill/>
+          <a:ln w="9525">
+            <a:noFill/>
+            <a:miter lim="800000"/>
+            <a:headEnd/>
+            <a:tailEnd/>
+          </a:ln>
+          <a:effectLst/>
+        </p:spPr>
+        <p:txBody>
+          <a:bodyPr vert="horz" wrap="square" lIns="91440" tIns="45720" rIns="91440" bIns="45720" numCol="1" anchor="t" anchorCtr="0" compatLnSpc="1">
+            <a:prstTxWarp prst="textNoShape">
+              <a:avLst/>
+            </a:prstTxWarp>
+          </a:bodyPr>
+          <a:lstStyle>
+            <a:lvl1pPr algn="r">
+              <a:defRPr sz="1200" dirty="0" err="1" smtClean="0">
+                <a:latin typeface="+mn-lt"/>
+              </a:defRPr>
+            </a:lvl1pPr>
+          </a:lstStyle>
+          <a:p>
+            <a:pPr marL="0" marR="0" lvl="0" indent="0" algn="r" defTabSz="914400" rtl="0" eaLnBrk="1" fontAlgn="base" latinLnBrk="0" hangingPunct="1">
+              <a:lnSpc>
+                <a:spcPct val="100000"/>
+              </a:lnSpc>
+              <a:spcBef>
+                <a:spcPct val="0"/>
+              </a:spcBef>
+              <a:spcAft>
+                <a:spcPct val="0"/>
+              </a:spcAft>
+              <a:buClrTx/>
+              <a:buSzTx/>
+              <a:buFontTx/>
+              <a:buNone/>
+              <a:tabLst/>
+              <a:defRPr/>
+            </a:pPr>
+            <a:r>
+              <a:rPr kumimoji="0" lang="en-US" sz="1200" b="0" i="0" u="none" strike="noStrike" kern="1200" cap="none" spc="0" normalizeH="0" baseline="0" noProof="0" dirty="0" smtClean="0">
+                <a:ln>
+                  <a:noFill/>
+                </a:ln>
+                <a:solidFill>
+                  <a:schemeClr val="tx1"/>
+                </a:solidFill>
+                <a:effectLst/>
+                <a:uLnTx/>
+                <a:uFillTx/>
+                <a:latin typeface="Comic Sans MS"/>
+                <a:ea typeface="+mn-ea"/>
+                <a:cs typeface="Comic Sans MS"/>
+              </a:rPr>
+              <a:t>testing.</a:t>
+            </a:r>
+            <a:fld id="{B9A0B45D-6AFD-413C-B761-B121FB8BE940}" type="slidenum">
+              <a:rPr kumimoji="0" lang="en-US" sz="1200" b="0" i="0" u="none" strike="noStrike" kern="1200" cap="none" spc="0" normalizeH="0" baseline="0" noProof="0" smtClean="0">
+                <a:ln>
+                  <a:noFill/>
+                </a:ln>
+                <a:solidFill>
+                  <a:schemeClr val="tx1"/>
+                </a:solidFill>
+                <a:effectLst/>
+                <a:uLnTx/>
+                <a:uFillTx/>
+                <a:latin typeface="Comic Sans MS"/>
+                <a:ea typeface="+mn-ea"/>
+                <a:cs typeface="Comic Sans MS"/>
+              </a:rPr>
+              <a:pPr marL="0" marR="0" lvl="0" indent="0" algn="r" defTabSz="914400" rtl="0" eaLnBrk="1" fontAlgn="base" latinLnBrk="0" hangingPunct="1">
+                <a:lnSpc>
+                  <a:spcPct val="100000"/>
+                </a:lnSpc>
+                <a:spcBef>
+                  <a:spcPct val="0"/>
+                </a:spcBef>
+                <a:spcAft>
+                  <a:spcPct val="0"/>
+                </a:spcAft>
+                <a:buClrTx/>
+                <a:buSzTx/>
+                <a:buFontTx/>
+                <a:buNone/>
+                <a:tabLst/>
+                <a:defRPr/>
+              </a:pPr>
+              <a:t>39</a:t>
+            </a:fld>
+            <a:endParaRPr kumimoji="0" lang="en-US" sz="1200" b="0" i="0" u="none" strike="noStrike" kern="1200" cap="none" spc="0" normalizeH="0" baseline="0" noProof="0" dirty="0">
+              <a:ln>
+                <a:noFill/>
+              </a:ln>
+              <a:solidFill>
+                <a:schemeClr val="tx1"/>
+              </a:solidFill>
+              <a:effectLst/>
+              <a:uLnTx/>
+              <a:uFillTx/>
+              <a:latin typeface="Comic Sans MS"/>
+              <a:ea typeface="+mn-ea"/>
+              <a:cs typeface="Comic Sans MS"/>
+            </a:endParaRPr>
+          </a:p>
+        </p:txBody>
+      </p:sp>
+      <p:sp>
+        <p:nvSpPr>
+          <p:cNvPr id="8" name="Rectangle 4"/>
+          <p:cNvSpPr txBox="1">
+            <a:spLocks noChangeArrowheads="1"/>
+          </p:cNvSpPr>
+          <p:nvPr/>
+        </p:nvSpPr>
+        <p:spPr bwMode="auto">
+          <a:xfrm>
+            <a:off x="1355099" y="152400"/>
+            <a:ext cx="7266290" cy="1112484"/>
+          </a:xfrm>
+          <a:prstGeom prst="rect">
+            <a:avLst/>
+          </a:prstGeom>
+          <a:noFill/>
+          <a:ln w="9525">
+            <a:noFill/>
+            <a:miter lim="800000"/>
+            <a:headEnd/>
+            <a:tailEnd/>
+          </a:ln>
+        </p:spPr>
+        <p:txBody>
+          <a:bodyPr vert="horz" wrap="square" lIns="91440" tIns="45720" rIns="91440" bIns="45720" numCol="1" anchor="ctr" anchorCtr="0" compatLnSpc="1">
+            <a:prstTxWarp prst="textNoShape">
+              <a:avLst/>
+            </a:prstTxWarp>
+          </a:bodyPr>
+          <a:lstStyle>
+            <a:lvl1pPr algn="ctr" rtl="0" eaLnBrk="0" fontAlgn="base" hangingPunct="0">
+              <a:spcBef>
+                <a:spcPct val="0"/>
+              </a:spcBef>
+              <a:spcAft>
+                <a:spcPct val="0"/>
+              </a:spcAft>
+              <a:defRPr sz="3200" b="1">
+                <a:solidFill>
+                  <a:schemeClr val="tx2"/>
+                </a:solidFill>
+                <a:latin typeface="+mj-lt"/>
+                <a:ea typeface="+mj-ea"/>
+                <a:cs typeface="+mj-cs"/>
+              </a:defRPr>
+            </a:lvl1pPr>
+            <a:lvl2pPr algn="ctr" rtl="0" eaLnBrk="0" fontAlgn="base" hangingPunct="0">
+              <a:spcBef>
+                <a:spcPct val="0"/>
+              </a:spcBef>
+              <a:spcAft>
+                <a:spcPct val="0"/>
+              </a:spcAft>
+              <a:defRPr sz="3600" b="1">
+                <a:solidFill>
+                  <a:schemeClr val="tx2"/>
+                </a:solidFill>
+                <a:latin typeface="Comic Sans MS" pitchFamily="66" charset="0"/>
+              </a:defRPr>
+            </a:lvl2pPr>
+            <a:lvl3pPr algn="ctr" rtl="0" eaLnBrk="0" fontAlgn="base" hangingPunct="0">
+              <a:spcBef>
+                <a:spcPct val="0"/>
+              </a:spcBef>
+              <a:spcAft>
+                <a:spcPct val="0"/>
+              </a:spcAft>
+              <a:defRPr sz="3600" b="1">
+                <a:solidFill>
+                  <a:schemeClr val="tx2"/>
+                </a:solidFill>
+                <a:latin typeface="Comic Sans MS" pitchFamily="66" charset="0"/>
+              </a:defRPr>
+            </a:lvl3pPr>
+            <a:lvl4pPr algn="ctr" rtl="0" eaLnBrk="0" fontAlgn="base" hangingPunct="0">
+              <a:spcBef>
+                <a:spcPct val="0"/>
+              </a:spcBef>
+              <a:spcAft>
+                <a:spcPct val="0"/>
+              </a:spcAft>
+              <a:defRPr sz="3600" b="1">
+                <a:solidFill>
+                  <a:schemeClr val="tx2"/>
+                </a:solidFill>
+                <a:latin typeface="Comic Sans MS" pitchFamily="66" charset="0"/>
+              </a:defRPr>
+            </a:lvl4pPr>
+            <a:lvl5pPr algn="ctr" rtl="0" eaLnBrk="0" fontAlgn="base" hangingPunct="0">
+              <a:spcBef>
+                <a:spcPct val="0"/>
+              </a:spcBef>
+              <a:spcAft>
+                <a:spcPct val="0"/>
+              </a:spcAft>
+              <a:defRPr sz="3600" b="1">
+                <a:solidFill>
+                  <a:schemeClr val="tx2"/>
+                </a:solidFill>
+                <a:latin typeface="Comic Sans MS" pitchFamily="66" charset="0"/>
+              </a:defRPr>
+            </a:lvl5pPr>
+            <a:lvl6pPr marL="457200" algn="ctr" rtl="0" fontAlgn="base">
+              <a:spcBef>
+                <a:spcPct val="0"/>
+              </a:spcBef>
+              <a:spcAft>
+                <a:spcPct val="0"/>
+              </a:spcAft>
+              <a:defRPr sz="3600" b="1">
+                <a:solidFill>
+                  <a:schemeClr val="tx2"/>
+                </a:solidFill>
+                <a:latin typeface="Comic Sans MS" pitchFamily="66" charset="0"/>
+              </a:defRPr>
+            </a:lvl6pPr>
+            <a:lvl7pPr marL="914400" algn="ctr" rtl="0" fontAlgn="base">
+              <a:spcBef>
+                <a:spcPct val="0"/>
+              </a:spcBef>
+              <a:spcAft>
+                <a:spcPct val="0"/>
+              </a:spcAft>
+              <a:defRPr sz="3600" b="1">
+                <a:solidFill>
+                  <a:schemeClr val="tx2"/>
+                </a:solidFill>
+                <a:latin typeface="Comic Sans MS" pitchFamily="66" charset="0"/>
+              </a:defRPr>
+            </a:lvl7pPr>
+            <a:lvl8pPr marL="1371600" algn="ctr" rtl="0" fontAlgn="base">
+              <a:spcBef>
+                <a:spcPct val="0"/>
+              </a:spcBef>
+              <a:spcAft>
+                <a:spcPct val="0"/>
+              </a:spcAft>
+              <a:defRPr sz="3600" b="1">
+                <a:solidFill>
+                  <a:schemeClr val="tx2"/>
+                </a:solidFill>
+                <a:latin typeface="Comic Sans MS" pitchFamily="66" charset="0"/>
+              </a:defRPr>
+            </a:lvl8pPr>
+            <a:lvl9pPr marL="1828800" algn="ctr" rtl="0" fontAlgn="base">
+              <a:spcBef>
+                <a:spcPct val="0"/>
+              </a:spcBef>
+              <a:spcAft>
+                <a:spcPct val="0"/>
+              </a:spcAft>
+              <a:defRPr sz="3600" b="1">
+                <a:solidFill>
+                  <a:schemeClr val="tx2"/>
+                </a:solidFill>
+                <a:latin typeface="Comic Sans MS" pitchFamily="66" charset="0"/>
+              </a:defRPr>
+            </a:lvl9pPr>
+          </a:lstStyle>
+          <a:p>
+            <a:pPr eaLnBrk="1" hangingPunct="1"/>
+            <a:r>
+              <a:rPr lang="en-US" sz="4400" dirty="0" smtClean="0">
+                <a:solidFill>
+                  <a:schemeClr val="tx1"/>
+                </a:solidFill>
+                <a:latin typeface="Comic Sans MS"/>
+                <a:cs typeface="Comic Sans MS"/>
+              </a:rPr>
+              <a:t>98% </a:t>
+            </a:r>
+            <a:r>
+              <a:rPr lang="en-US" sz="4400" dirty="0" smtClean="0">
+                <a:solidFill>
+                  <a:schemeClr val="tx1"/>
+                </a:solidFill>
+                <a:latin typeface="Comic Sans MS"/>
+                <a:cs typeface="Comic Sans MS"/>
+              </a:rPr>
+              <a:t>accuracy still useful</a:t>
+            </a:r>
+          </a:p>
+        </p:txBody>
+      </p:sp>
+    </p:spTree>
+    <p:extLst>
+      <p:ext uri="{BB962C8B-B14F-4D97-AF65-F5344CB8AC3E}">
+        <p14:creationId xmlns:p14="http://schemas.microsoft.com/office/powerpoint/2010/main" val="230497036"/>
+      </p:ext>
+    </p:extLst>
+  </p:cSld>
+  <p:clrMapOvr>
+    <a:masterClrMapping/>
+  </p:clrMapOvr>
+  <p:transition xmlns:p14="http://schemas.microsoft.com/office/powerpoint/2010/main" spd="slow" advClick="0">
+    <p:fade thruBlk="1"/>
+  </p:transition>
+  <p:timing>
+    <p:tnLst>
+      <p:par>
+        <p:cTn xmlns:p14="http://schemas.microsoft.com/office/powerpoint/2010/main" id="1" dur="indefinite" restart="never" nodeType="tmRoot"/>
+      </p:par>
+    </p:tnLst>
+  </p:timing>
+</p:sld>
+</file>
+
 <file path=ppt/slides/slide4.xml><?xml version="1.0" encoding="utf-8"?>
 <p:sld xmlns:a="http://schemas.openxmlformats.org/drawingml/2006/main" xmlns:r="http://schemas.openxmlformats.org/officeDocument/2006/relationships" xmlns:p="http://schemas.openxmlformats.org/presentationml/2006/main">
   <p:cSld>
@@ -16743,6 +18763,1540 @@
     </mc:Choice>
     <mc:Fallback xmlns="">
       <p:transition xmlns:p14="http://schemas.microsoft.com/office/powerpoint/2010/main" spd="slow" advClick="0">
+        <p:fade/>
+      </p:transition>
+    </mc:Fallback>
+  </mc:AlternateContent>
+  <p:timing>
+    <p:tnLst>
+      <p:par>
+        <p:cTn xmlns:p14="http://schemas.microsoft.com/office/powerpoint/2010/main" id="1" dur="indefinite" restart="never" nodeType="tmRoot"/>
+      </p:par>
+    </p:tnLst>
+  </p:timing>
+</p:sld>
+</file>
+
+<file path=ppt/slides/slide40.xml><?xml version="1.0" encoding="utf-8"?>
+<p:sld xmlns:a="http://schemas.openxmlformats.org/drawingml/2006/main" xmlns:r="http://schemas.openxmlformats.org/officeDocument/2006/relationships" xmlns:p="http://schemas.openxmlformats.org/presentationml/2006/main">
+  <p:cSld>
+    <p:spTree>
+      <p:nvGrpSpPr>
+        <p:cNvPr id="1" name=""/>
+        <p:cNvGrpSpPr/>
+        <p:nvPr/>
+      </p:nvGrpSpPr>
+      <p:grpSpPr>
+        <a:xfrm>
+          <a:off x="0" y="0"/>
+          <a:ext cx="0" cy="0"/>
+          <a:chOff x="0" y="0"/>
+          <a:chExt cx="0" cy="0"/>
+        </a:xfrm>
+      </p:grpSpPr>
+      <p:sp>
+        <p:nvSpPr>
+          <p:cNvPr id="6" name="TextBox 5"/>
+          <p:cNvSpPr txBox="1"/>
+          <p:nvPr/>
+        </p:nvSpPr>
+        <p:spPr>
+          <a:xfrm>
+            <a:off x="152400" y="1143000"/>
+            <a:ext cx="8800644" cy="4912114"/>
+          </a:xfrm>
+          <a:prstGeom prst="rect">
+            <a:avLst/>
+          </a:prstGeom>
+          <a:noFill/>
+        </p:spPr>
+        <p:txBody>
+          <a:bodyPr wrap="none" rtlCol="0">
+            <a:spAutoFit/>
+          </a:bodyPr>
+          <a:lstStyle/>
+          <a:p>
+            <a:pPr algn="l"/>
+            <a:r>
+              <a:rPr lang="en-US" sz="5400" dirty="0" smtClean="0">
+                <a:latin typeface="Comic Sans MS"/>
+                <a:cs typeface="Comic Sans MS"/>
+              </a:rPr>
+              <a:t>If you medicate at random</a:t>
+            </a:r>
+          </a:p>
+          <a:p>
+            <a:pPr algn="l"/>
+            <a:r>
+              <a:rPr lang="en-US" sz="5400" dirty="0" smtClean="0">
+                <a:latin typeface="Comic Sans MS"/>
+                <a:cs typeface="Comic Sans MS"/>
+              </a:rPr>
+              <a:t>you’ll only medicate</a:t>
+            </a:r>
+          </a:p>
+          <a:p>
+            <a:pPr algn="l"/>
+            <a:endParaRPr lang="en-US" sz="5400" dirty="0" smtClean="0">
+              <a:latin typeface="Comic Sans MS"/>
+              <a:cs typeface="Comic Sans MS"/>
+            </a:endParaRPr>
+          </a:p>
+          <a:p>
+            <a:pPr algn="l"/>
+            <a:endParaRPr lang="en-US" sz="5400" dirty="0" smtClean="0">
+              <a:latin typeface="Comic Sans MS"/>
+              <a:cs typeface="Comic Sans MS"/>
+            </a:endParaRPr>
+          </a:p>
+          <a:p>
+            <a:r>
+              <a:rPr lang="en-US" sz="5400" dirty="0" smtClean="0">
+                <a:latin typeface="Comic Sans MS"/>
+                <a:cs typeface="Comic Sans MS"/>
+              </a:rPr>
+              <a:t>of sick people.</a:t>
+            </a:r>
+            <a:endParaRPr lang="en-US" sz="5400" dirty="0" smtClean="0">
+              <a:latin typeface="Comic Sans MS"/>
+              <a:cs typeface="Comic Sans MS"/>
+            </a:endParaRPr>
+          </a:p>
+        </p:txBody>
+      </p:sp>
+      <p:sp>
+        <p:nvSpPr>
+          <p:cNvPr id="5" name="Rectangle 4"/>
+          <p:cNvSpPr txBox="1">
+            <a:spLocks noChangeArrowheads="1"/>
+          </p:cNvSpPr>
+          <p:nvPr/>
+        </p:nvSpPr>
+        <p:spPr bwMode="auto">
+          <a:xfrm>
+            <a:off x="7696200" y="6629400"/>
+            <a:ext cx="1447800" cy="228600"/>
+          </a:xfrm>
+          <a:prstGeom prst="rect">
+            <a:avLst/>
+          </a:prstGeom>
+          <a:noFill/>
+          <a:ln w="9525">
+            <a:noFill/>
+            <a:miter lim="800000"/>
+            <a:headEnd/>
+            <a:tailEnd/>
+          </a:ln>
+          <a:effectLst/>
+        </p:spPr>
+        <p:txBody>
+          <a:bodyPr vert="horz" wrap="square" lIns="91440" tIns="45720" rIns="91440" bIns="45720" numCol="1" anchor="t" anchorCtr="0" compatLnSpc="1">
+            <a:prstTxWarp prst="textNoShape">
+              <a:avLst/>
+            </a:prstTxWarp>
+          </a:bodyPr>
+          <a:lstStyle>
+            <a:lvl1pPr algn="r">
+              <a:defRPr sz="1200" dirty="0" err="1" smtClean="0">
+                <a:latin typeface="+mn-lt"/>
+              </a:defRPr>
+            </a:lvl1pPr>
+          </a:lstStyle>
+          <a:p>
+            <a:pPr marL="0" marR="0" lvl="0" indent="0" algn="r" defTabSz="914400" rtl="0" eaLnBrk="1" fontAlgn="base" latinLnBrk="0" hangingPunct="1">
+              <a:lnSpc>
+                <a:spcPct val="100000"/>
+              </a:lnSpc>
+              <a:spcBef>
+                <a:spcPct val="0"/>
+              </a:spcBef>
+              <a:spcAft>
+                <a:spcPct val="0"/>
+              </a:spcAft>
+              <a:buClrTx/>
+              <a:buSzTx/>
+              <a:buFontTx/>
+              <a:buNone/>
+              <a:tabLst/>
+              <a:defRPr/>
+            </a:pPr>
+            <a:r>
+              <a:rPr kumimoji="0" lang="en-US" sz="1200" b="0" i="0" u="none" strike="noStrike" kern="1200" cap="none" spc="0" normalizeH="0" baseline="0" noProof="0" dirty="0" smtClean="0">
+                <a:ln>
+                  <a:noFill/>
+                </a:ln>
+                <a:solidFill>
+                  <a:schemeClr val="tx1"/>
+                </a:solidFill>
+                <a:effectLst/>
+                <a:uLnTx/>
+                <a:uFillTx/>
+                <a:latin typeface="Comic Sans MS"/>
+                <a:ea typeface="+mn-ea"/>
+                <a:cs typeface="Comic Sans MS"/>
+              </a:rPr>
+              <a:t>testing.</a:t>
+            </a:r>
+            <a:fld id="{B9A0B45D-6AFD-413C-B761-B121FB8BE940}" type="slidenum">
+              <a:rPr kumimoji="0" lang="en-US" sz="1200" b="0" i="0" u="none" strike="noStrike" kern="1200" cap="none" spc="0" normalizeH="0" baseline="0" noProof="0" smtClean="0">
+                <a:ln>
+                  <a:noFill/>
+                </a:ln>
+                <a:solidFill>
+                  <a:schemeClr val="tx1"/>
+                </a:solidFill>
+                <a:effectLst/>
+                <a:uLnTx/>
+                <a:uFillTx/>
+                <a:latin typeface="Comic Sans MS"/>
+                <a:ea typeface="+mn-ea"/>
+                <a:cs typeface="Comic Sans MS"/>
+              </a:rPr>
+              <a:pPr marL="0" marR="0" lvl="0" indent="0" algn="r" defTabSz="914400" rtl="0" eaLnBrk="1" fontAlgn="base" latinLnBrk="0" hangingPunct="1">
+                <a:lnSpc>
+                  <a:spcPct val="100000"/>
+                </a:lnSpc>
+                <a:spcBef>
+                  <a:spcPct val="0"/>
+                </a:spcBef>
+                <a:spcAft>
+                  <a:spcPct val="0"/>
+                </a:spcAft>
+                <a:buClrTx/>
+                <a:buSzTx/>
+                <a:buFontTx/>
+                <a:buNone/>
+                <a:tabLst/>
+                <a:defRPr/>
+              </a:pPr>
+              <a:t>40</a:t>
+            </a:fld>
+            <a:endParaRPr kumimoji="0" lang="en-US" sz="1200" b="0" i="0" u="none" strike="noStrike" kern="1200" cap="none" spc="0" normalizeH="0" baseline="0" noProof="0" dirty="0">
+              <a:ln>
+                <a:noFill/>
+              </a:ln>
+              <a:solidFill>
+                <a:schemeClr val="tx1"/>
+              </a:solidFill>
+              <a:effectLst/>
+              <a:uLnTx/>
+              <a:uFillTx/>
+              <a:latin typeface="Comic Sans MS"/>
+              <a:ea typeface="+mn-ea"/>
+              <a:cs typeface="Comic Sans MS"/>
+            </a:endParaRPr>
+          </a:p>
+        </p:txBody>
+      </p:sp>
+      <p:sp>
+        <p:nvSpPr>
+          <p:cNvPr id="8" name="Rectangle 4"/>
+          <p:cNvSpPr txBox="1">
+            <a:spLocks noChangeArrowheads="1"/>
+          </p:cNvSpPr>
+          <p:nvPr/>
+        </p:nvSpPr>
+        <p:spPr bwMode="auto">
+          <a:xfrm>
+            <a:off x="1355099" y="152400"/>
+            <a:ext cx="7266290" cy="1112484"/>
+          </a:xfrm>
+          <a:prstGeom prst="rect">
+            <a:avLst/>
+          </a:prstGeom>
+          <a:noFill/>
+          <a:ln w="9525">
+            <a:noFill/>
+            <a:miter lim="800000"/>
+            <a:headEnd/>
+            <a:tailEnd/>
+          </a:ln>
+        </p:spPr>
+        <p:txBody>
+          <a:bodyPr vert="horz" wrap="square" lIns="91440" tIns="45720" rIns="91440" bIns="45720" numCol="1" anchor="ctr" anchorCtr="0" compatLnSpc="1">
+            <a:prstTxWarp prst="textNoShape">
+              <a:avLst/>
+            </a:prstTxWarp>
+          </a:bodyPr>
+          <a:lstStyle>
+            <a:lvl1pPr algn="ctr" rtl="0" eaLnBrk="0" fontAlgn="base" hangingPunct="0">
+              <a:spcBef>
+                <a:spcPct val="0"/>
+              </a:spcBef>
+              <a:spcAft>
+                <a:spcPct val="0"/>
+              </a:spcAft>
+              <a:defRPr sz="3200" b="1">
+                <a:solidFill>
+                  <a:schemeClr val="tx2"/>
+                </a:solidFill>
+                <a:latin typeface="+mj-lt"/>
+                <a:ea typeface="+mj-ea"/>
+                <a:cs typeface="+mj-cs"/>
+              </a:defRPr>
+            </a:lvl1pPr>
+            <a:lvl2pPr algn="ctr" rtl="0" eaLnBrk="0" fontAlgn="base" hangingPunct="0">
+              <a:spcBef>
+                <a:spcPct val="0"/>
+              </a:spcBef>
+              <a:spcAft>
+                <a:spcPct val="0"/>
+              </a:spcAft>
+              <a:defRPr sz="3600" b="1">
+                <a:solidFill>
+                  <a:schemeClr val="tx2"/>
+                </a:solidFill>
+                <a:latin typeface="Comic Sans MS" pitchFamily="66" charset="0"/>
+              </a:defRPr>
+            </a:lvl2pPr>
+            <a:lvl3pPr algn="ctr" rtl="0" eaLnBrk="0" fontAlgn="base" hangingPunct="0">
+              <a:spcBef>
+                <a:spcPct val="0"/>
+              </a:spcBef>
+              <a:spcAft>
+                <a:spcPct val="0"/>
+              </a:spcAft>
+              <a:defRPr sz="3600" b="1">
+                <a:solidFill>
+                  <a:schemeClr val="tx2"/>
+                </a:solidFill>
+                <a:latin typeface="Comic Sans MS" pitchFamily="66" charset="0"/>
+              </a:defRPr>
+            </a:lvl3pPr>
+            <a:lvl4pPr algn="ctr" rtl="0" eaLnBrk="0" fontAlgn="base" hangingPunct="0">
+              <a:spcBef>
+                <a:spcPct val="0"/>
+              </a:spcBef>
+              <a:spcAft>
+                <a:spcPct val="0"/>
+              </a:spcAft>
+              <a:defRPr sz="3600" b="1">
+                <a:solidFill>
+                  <a:schemeClr val="tx2"/>
+                </a:solidFill>
+                <a:latin typeface="Comic Sans MS" pitchFamily="66" charset="0"/>
+              </a:defRPr>
+            </a:lvl4pPr>
+            <a:lvl5pPr algn="ctr" rtl="0" eaLnBrk="0" fontAlgn="base" hangingPunct="0">
+              <a:spcBef>
+                <a:spcPct val="0"/>
+              </a:spcBef>
+              <a:spcAft>
+                <a:spcPct val="0"/>
+              </a:spcAft>
+              <a:defRPr sz="3600" b="1">
+                <a:solidFill>
+                  <a:schemeClr val="tx2"/>
+                </a:solidFill>
+                <a:latin typeface="Comic Sans MS" pitchFamily="66" charset="0"/>
+              </a:defRPr>
+            </a:lvl5pPr>
+            <a:lvl6pPr marL="457200" algn="ctr" rtl="0" fontAlgn="base">
+              <a:spcBef>
+                <a:spcPct val="0"/>
+              </a:spcBef>
+              <a:spcAft>
+                <a:spcPct val="0"/>
+              </a:spcAft>
+              <a:defRPr sz="3600" b="1">
+                <a:solidFill>
+                  <a:schemeClr val="tx2"/>
+                </a:solidFill>
+                <a:latin typeface="Comic Sans MS" pitchFamily="66" charset="0"/>
+              </a:defRPr>
+            </a:lvl6pPr>
+            <a:lvl7pPr marL="914400" algn="ctr" rtl="0" fontAlgn="base">
+              <a:spcBef>
+                <a:spcPct val="0"/>
+              </a:spcBef>
+              <a:spcAft>
+                <a:spcPct val="0"/>
+              </a:spcAft>
+              <a:defRPr sz="3600" b="1">
+                <a:solidFill>
+                  <a:schemeClr val="tx2"/>
+                </a:solidFill>
+                <a:latin typeface="Comic Sans MS" pitchFamily="66" charset="0"/>
+              </a:defRPr>
+            </a:lvl7pPr>
+            <a:lvl8pPr marL="1371600" algn="ctr" rtl="0" fontAlgn="base">
+              <a:spcBef>
+                <a:spcPct val="0"/>
+              </a:spcBef>
+              <a:spcAft>
+                <a:spcPct val="0"/>
+              </a:spcAft>
+              <a:defRPr sz="3600" b="1">
+                <a:solidFill>
+                  <a:schemeClr val="tx2"/>
+                </a:solidFill>
+                <a:latin typeface="Comic Sans MS" pitchFamily="66" charset="0"/>
+              </a:defRPr>
+            </a:lvl8pPr>
+            <a:lvl9pPr marL="1828800" algn="ctr" rtl="0" fontAlgn="base">
+              <a:spcBef>
+                <a:spcPct val="0"/>
+              </a:spcBef>
+              <a:spcAft>
+                <a:spcPct val="0"/>
+              </a:spcAft>
+              <a:defRPr sz="3600" b="1">
+                <a:solidFill>
+                  <a:schemeClr val="tx2"/>
+                </a:solidFill>
+                <a:latin typeface="Comic Sans MS" pitchFamily="66" charset="0"/>
+              </a:defRPr>
+            </a:lvl9pPr>
+          </a:lstStyle>
+          <a:p>
+            <a:pPr eaLnBrk="1" hangingPunct="1"/>
+            <a:r>
+              <a:rPr lang="en-US" sz="4400" dirty="0" smtClean="0">
+                <a:solidFill>
+                  <a:schemeClr val="tx1"/>
+                </a:solidFill>
+                <a:latin typeface="Comic Sans MS"/>
+                <a:cs typeface="Comic Sans MS"/>
+              </a:rPr>
+              <a:t>98% </a:t>
+            </a:r>
+            <a:r>
+              <a:rPr lang="en-US" sz="4400" dirty="0" smtClean="0">
+                <a:solidFill>
+                  <a:schemeClr val="tx1"/>
+                </a:solidFill>
+                <a:latin typeface="Comic Sans MS"/>
+                <a:cs typeface="Comic Sans MS"/>
+              </a:rPr>
+              <a:t>accuracy still useful</a:t>
+            </a:r>
+          </a:p>
+        </p:txBody>
+      </p:sp>
+      <p:graphicFrame>
+        <p:nvGraphicFramePr>
+          <p:cNvPr id="3" name="Object 2"/>
+          <p:cNvGraphicFramePr>
+            <a:graphicFrameLocks noChangeAspect="1"/>
+          </p:cNvGraphicFramePr>
+          <p:nvPr>
+            <p:extLst>
+              <p:ext uri="{D42A27DB-BD31-4B8C-83A1-F6EECF244321}">
+                <p14:modId xmlns:p14="http://schemas.microsoft.com/office/powerpoint/2010/main" val="1858814406"/>
+              </p:ext>
+            </p:extLst>
+          </p:nvPr>
+        </p:nvGraphicFramePr>
+        <p:xfrm>
+          <a:off x="3048000" y="2819400"/>
+          <a:ext cx="3464012" cy="2209800"/>
+        </p:xfrm>
+        <a:graphic>
+          <a:graphicData uri="http://schemas.openxmlformats.org/presentationml/2006/ole">
+            <mc:AlternateContent xmlns:mc="http://schemas.openxmlformats.org/markup-compatibility/2006">
+              <mc:Choice xmlns:v="urn:schemas-microsoft-com:vml" Requires="v">
+                <p:oleObj spid="_x0000_s169987" name="Equation" r:id="rId3" imgW="736600" imgH="469900" progId="Equation.DSMT4">
+                  <p:embed/>
+                </p:oleObj>
+              </mc:Choice>
+              <mc:Fallback>
+                <p:oleObj name="Equation" r:id="rId3" imgW="736600" imgH="469900" progId="Equation.DSMT4">
+                  <p:embed/>
+                  <p:pic>
+                    <p:nvPicPr>
+                      <p:cNvPr id="0" name=""/>
+                      <p:cNvPicPr/>
+                      <p:nvPr/>
+                    </p:nvPicPr>
+                    <p:blipFill>
+                      <a:blip r:embed="rId4"/>
+                      <a:stretch>
+                        <a:fillRect/>
+                      </a:stretch>
+                    </p:blipFill>
+                    <p:spPr>
+                      <a:xfrm>
+                        <a:off x="3048000" y="2819400"/>
+                        <a:ext cx="3464012" cy="2209800"/>
+                      </a:xfrm>
+                      <a:prstGeom prst="rect">
+                        <a:avLst/>
+                      </a:prstGeom>
+                    </p:spPr>
+                  </p:pic>
+                </p:oleObj>
+              </mc:Fallback>
+            </mc:AlternateContent>
+          </a:graphicData>
+        </a:graphic>
+      </p:graphicFrame>
+    </p:spTree>
+    <p:extLst>
+      <p:ext uri="{BB962C8B-B14F-4D97-AF65-F5344CB8AC3E}">
+        <p14:creationId xmlns:p14="http://schemas.microsoft.com/office/powerpoint/2010/main" val="79883687"/>
+      </p:ext>
+    </p:extLst>
+  </p:cSld>
+  <p:clrMapOvr>
+    <a:masterClrMapping/>
+  </p:clrMapOvr>
+  <p:transition xmlns:p14="http://schemas.microsoft.com/office/powerpoint/2010/main" spd="slow" advClick="0">
+    <p:fade/>
+  </p:transition>
+  <p:timing>
+    <p:tnLst>
+      <p:par>
+        <p:cTn xmlns:p14="http://schemas.microsoft.com/office/powerpoint/2010/main" id="1" dur="indefinite" restart="never" nodeType="tmRoot">
+          <p:childTnLst>
+            <p:seq concurrent="1" nextAc="seek">
+              <p:cTn id="2" dur="indefinite" nodeType="mainSeq">
+                <p:childTnLst>
+                  <p:par>
+                    <p:cTn id="3" fill="hold">
+                      <p:stCondLst>
+                        <p:cond delay="indefinite"/>
+                      </p:stCondLst>
+                      <p:childTnLst>
+                        <p:par>
+                          <p:cTn id="4" fill="hold">
+                            <p:stCondLst>
+                              <p:cond delay="0"/>
+                            </p:stCondLst>
+                            <p:childTnLst>
+                              <p:par>
+                                <p:cTn id="5" presetID="10" presetClass="entr" presetSubtype="0" fill="hold" nodeType="clickEffect">
+                                  <p:stCondLst>
+                                    <p:cond delay="0"/>
+                                  </p:stCondLst>
+                                  <p:childTnLst>
+                                    <p:set>
+                                      <p:cBhvr>
+                                        <p:cTn id="6" dur="1" fill="hold">
+                                          <p:stCondLst>
+                                            <p:cond delay="0"/>
+                                          </p:stCondLst>
+                                        </p:cTn>
+                                        <p:tgtEl>
+                                          <p:spTgt spid="6">
+                                            <p:txEl>
+                                              <p:pRg st="1" end="1"/>
+                                            </p:txEl>
+                                          </p:spTgt>
+                                        </p:tgtEl>
+                                        <p:attrNameLst>
+                                          <p:attrName>style.visibility</p:attrName>
+                                        </p:attrNameLst>
+                                      </p:cBhvr>
+                                      <p:to>
+                                        <p:strVal val="visible"/>
+                                      </p:to>
+                                    </p:set>
+                                    <p:animEffect transition="in" filter="fade">
+                                      <p:cBhvr>
+                                        <p:cTn id="7" dur="500"/>
+                                        <p:tgtEl>
+                                          <p:spTgt spid="6">
+                                            <p:txEl>
+                                              <p:pRg st="1" end="1"/>
+                                            </p:txEl>
+                                          </p:spTgt>
+                                        </p:tgtEl>
+                                      </p:cBhvr>
+                                    </p:animEffect>
+                                  </p:childTnLst>
+                                </p:cTn>
+                              </p:par>
+                              <p:par>
+                                <p:cTn id="8" presetID="10" presetClass="entr" presetSubtype="0" fill="hold" nodeType="withEffect">
+                                  <p:stCondLst>
+                                    <p:cond delay="0"/>
+                                  </p:stCondLst>
+                                  <p:childTnLst>
+                                    <p:set>
+                                      <p:cBhvr>
+                                        <p:cTn id="9" dur="1" fill="hold">
+                                          <p:stCondLst>
+                                            <p:cond delay="0"/>
+                                          </p:stCondLst>
+                                        </p:cTn>
+                                        <p:tgtEl>
+                                          <p:spTgt spid="6">
+                                            <p:txEl>
+                                              <p:pRg st="4" end="4"/>
+                                            </p:txEl>
+                                          </p:spTgt>
+                                        </p:tgtEl>
+                                        <p:attrNameLst>
+                                          <p:attrName>style.visibility</p:attrName>
+                                        </p:attrNameLst>
+                                      </p:cBhvr>
+                                      <p:to>
+                                        <p:strVal val="visible"/>
+                                      </p:to>
+                                    </p:set>
+                                    <p:animEffect transition="in" filter="fade">
+                                      <p:cBhvr>
+                                        <p:cTn id="10" dur="500"/>
+                                        <p:tgtEl>
+                                          <p:spTgt spid="6">
+                                            <p:txEl>
+                                              <p:pRg st="4" end="4"/>
+                                            </p:txEl>
+                                          </p:spTgt>
+                                        </p:tgtEl>
+                                      </p:cBhvr>
+                                    </p:animEffect>
+                                  </p:childTnLst>
+                                </p:cTn>
+                              </p:par>
+                              <p:par>
+                                <p:cTn id="11" presetID="10" presetClass="entr" presetSubtype="0" fill="hold" nodeType="withEffect">
+                                  <p:stCondLst>
+                                    <p:cond delay="0"/>
+                                  </p:stCondLst>
+                                  <p:childTnLst>
+                                    <p:set>
+                                      <p:cBhvr>
+                                        <p:cTn id="12" dur="1" fill="hold">
+                                          <p:stCondLst>
+                                            <p:cond delay="0"/>
+                                          </p:stCondLst>
+                                        </p:cTn>
+                                        <p:tgtEl>
+                                          <p:spTgt spid="3"/>
+                                        </p:tgtEl>
+                                        <p:attrNameLst>
+                                          <p:attrName>style.visibility</p:attrName>
+                                        </p:attrNameLst>
+                                      </p:cBhvr>
+                                      <p:to>
+                                        <p:strVal val="visible"/>
+                                      </p:to>
+                                    </p:set>
+                                    <p:animEffect transition="in" filter="fade">
+                                      <p:cBhvr>
+                                        <p:cTn id="13" dur="500"/>
+                                        <p:tgtEl>
+                                          <p:spTgt spid="3"/>
+                                        </p:tgtEl>
+                                      </p:cBhvr>
+                                    </p:animEffect>
+                                  </p:childTnLst>
+                                </p:cTn>
+                              </p:par>
+                            </p:childTnLst>
+                          </p:cTn>
+                        </p:par>
+                      </p:childTnLst>
+                    </p:cTn>
+                  </p:par>
+                </p:childTnLst>
+              </p:cTn>
+              <p:prevCondLst>
+                <p:cond evt="onPrev" delay="0">
+                  <p:tgtEl>
+                    <p:sldTgt/>
+                  </p:tgtEl>
+                </p:cond>
+              </p:prevCondLst>
+              <p:nextCondLst>
+                <p:cond evt="onNext" delay="0">
+                  <p:tgtEl>
+                    <p:sldTgt/>
+                  </p:tgtEl>
+                </p:cond>
+              </p:nextCondLst>
+            </p:seq>
+          </p:childTnLst>
+        </p:cTn>
+      </p:par>
+    </p:tnLst>
+  </p:timing>
+</p:sld>
+</file>
+
+<file path=ppt/slides/slide41.xml><?xml version="1.0" encoding="utf-8"?>
+<p:sld xmlns:a="http://schemas.openxmlformats.org/drawingml/2006/main" xmlns:r="http://schemas.openxmlformats.org/officeDocument/2006/relationships" xmlns:p="http://schemas.openxmlformats.org/presentationml/2006/main">
+  <p:cSld>
+    <p:spTree>
+      <p:nvGrpSpPr>
+        <p:cNvPr id="1" name=""/>
+        <p:cNvGrpSpPr/>
+        <p:nvPr/>
+      </p:nvGrpSpPr>
+      <p:grpSpPr>
+        <a:xfrm>
+          <a:off x="0" y="0"/>
+          <a:ext cx="0" cy="0"/>
+          <a:chOff x="0" y="0"/>
+          <a:chExt cx="0" cy="0"/>
+        </a:xfrm>
+      </p:grpSpPr>
+      <p:sp>
+        <p:nvSpPr>
+          <p:cNvPr id="6" name="TextBox 5"/>
+          <p:cNvSpPr txBox="1"/>
+          <p:nvPr/>
+        </p:nvSpPr>
+        <p:spPr>
+          <a:xfrm>
+            <a:off x="299715" y="1495282"/>
+            <a:ext cx="8615685" cy="1920526"/>
+          </a:xfrm>
+          <a:prstGeom prst="rect">
+            <a:avLst/>
+          </a:prstGeom>
+          <a:noFill/>
+        </p:spPr>
+        <p:txBody>
+          <a:bodyPr wrap="none" rtlCol="0">
+            <a:spAutoFit/>
+          </a:bodyPr>
+          <a:lstStyle/>
+          <a:p>
+            <a:pPr algn="l"/>
+            <a:r>
+              <a:rPr lang="en-US" sz="5400" dirty="0" smtClean="0">
+                <a:latin typeface="Comic Sans MS"/>
+                <a:cs typeface="Comic Sans MS"/>
+              </a:rPr>
+              <a:t>Instead, medicate </a:t>
+            </a:r>
+            <a:r>
+              <a:rPr lang="en-US" sz="5400" dirty="0" smtClean="0">
+                <a:latin typeface="Comic Sans MS"/>
+                <a:cs typeface="Comic Sans MS"/>
+              </a:rPr>
+              <a:t>the </a:t>
+            </a:r>
+            <a:r>
+              <a:rPr lang="en-US" sz="5400" dirty="0" smtClean="0">
+                <a:solidFill>
+                  <a:srgbClr val="0000E5"/>
+                </a:solidFill>
+                <a:latin typeface="Comic Sans MS"/>
+                <a:cs typeface="Comic Sans MS"/>
+              </a:rPr>
+              <a:t>7M</a:t>
+            </a:r>
+            <a:endParaRPr lang="en-US" sz="5400" dirty="0">
+              <a:latin typeface="Comic Sans MS"/>
+              <a:cs typeface="Comic Sans MS"/>
+            </a:endParaRPr>
+          </a:p>
+          <a:p>
+            <a:pPr algn="l"/>
+            <a:r>
+              <a:rPr lang="en-US" sz="5400" dirty="0" smtClean="0">
+                <a:latin typeface="Comic Sans MS"/>
+                <a:cs typeface="Comic Sans MS"/>
+              </a:rPr>
+              <a:t>who test </a:t>
+            </a:r>
+            <a:r>
+              <a:rPr lang="en-US" sz="5400" smtClean="0">
+                <a:latin typeface="Comic Sans MS"/>
+                <a:cs typeface="Comic Sans MS"/>
+              </a:rPr>
+              <a:t>positive.</a:t>
+            </a:r>
+            <a:endParaRPr lang="en-US" sz="5400" dirty="0" smtClean="0">
+              <a:latin typeface="Comic Sans MS"/>
+              <a:cs typeface="Comic Sans MS"/>
+            </a:endParaRPr>
+          </a:p>
+        </p:txBody>
+      </p:sp>
+      <p:sp>
+        <p:nvSpPr>
+          <p:cNvPr id="5" name="Rectangle 4"/>
+          <p:cNvSpPr txBox="1">
+            <a:spLocks noChangeArrowheads="1"/>
+          </p:cNvSpPr>
+          <p:nvPr/>
+        </p:nvSpPr>
+        <p:spPr bwMode="auto">
+          <a:xfrm>
+            <a:off x="1355099" y="152400"/>
+            <a:ext cx="7266290" cy="1112484"/>
+          </a:xfrm>
+          <a:prstGeom prst="rect">
+            <a:avLst/>
+          </a:prstGeom>
+          <a:noFill/>
+          <a:ln w="9525">
+            <a:noFill/>
+            <a:miter lim="800000"/>
+            <a:headEnd/>
+            <a:tailEnd/>
+          </a:ln>
+        </p:spPr>
+        <p:txBody>
+          <a:bodyPr vert="horz" wrap="square" lIns="91440" tIns="45720" rIns="91440" bIns="45720" numCol="1" anchor="ctr" anchorCtr="0" compatLnSpc="1">
+            <a:prstTxWarp prst="textNoShape">
+              <a:avLst/>
+            </a:prstTxWarp>
+          </a:bodyPr>
+          <a:lstStyle>
+            <a:lvl1pPr algn="ctr" rtl="0" eaLnBrk="0" fontAlgn="base" hangingPunct="0">
+              <a:spcBef>
+                <a:spcPct val="0"/>
+              </a:spcBef>
+              <a:spcAft>
+                <a:spcPct val="0"/>
+              </a:spcAft>
+              <a:defRPr sz="3200" b="1">
+                <a:solidFill>
+                  <a:schemeClr val="tx2"/>
+                </a:solidFill>
+                <a:latin typeface="+mj-lt"/>
+                <a:ea typeface="+mj-ea"/>
+                <a:cs typeface="+mj-cs"/>
+              </a:defRPr>
+            </a:lvl1pPr>
+            <a:lvl2pPr algn="ctr" rtl="0" eaLnBrk="0" fontAlgn="base" hangingPunct="0">
+              <a:spcBef>
+                <a:spcPct val="0"/>
+              </a:spcBef>
+              <a:spcAft>
+                <a:spcPct val="0"/>
+              </a:spcAft>
+              <a:defRPr sz="3600" b="1">
+                <a:solidFill>
+                  <a:schemeClr val="tx2"/>
+                </a:solidFill>
+                <a:latin typeface="Comic Sans MS" pitchFamily="66" charset="0"/>
+              </a:defRPr>
+            </a:lvl2pPr>
+            <a:lvl3pPr algn="ctr" rtl="0" eaLnBrk="0" fontAlgn="base" hangingPunct="0">
+              <a:spcBef>
+                <a:spcPct val="0"/>
+              </a:spcBef>
+              <a:spcAft>
+                <a:spcPct val="0"/>
+              </a:spcAft>
+              <a:defRPr sz="3600" b="1">
+                <a:solidFill>
+                  <a:schemeClr val="tx2"/>
+                </a:solidFill>
+                <a:latin typeface="Comic Sans MS" pitchFamily="66" charset="0"/>
+              </a:defRPr>
+            </a:lvl3pPr>
+            <a:lvl4pPr algn="ctr" rtl="0" eaLnBrk="0" fontAlgn="base" hangingPunct="0">
+              <a:spcBef>
+                <a:spcPct val="0"/>
+              </a:spcBef>
+              <a:spcAft>
+                <a:spcPct val="0"/>
+              </a:spcAft>
+              <a:defRPr sz="3600" b="1">
+                <a:solidFill>
+                  <a:schemeClr val="tx2"/>
+                </a:solidFill>
+                <a:latin typeface="Comic Sans MS" pitchFamily="66" charset="0"/>
+              </a:defRPr>
+            </a:lvl4pPr>
+            <a:lvl5pPr algn="ctr" rtl="0" eaLnBrk="0" fontAlgn="base" hangingPunct="0">
+              <a:spcBef>
+                <a:spcPct val="0"/>
+              </a:spcBef>
+              <a:spcAft>
+                <a:spcPct val="0"/>
+              </a:spcAft>
+              <a:defRPr sz="3600" b="1">
+                <a:solidFill>
+                  <a:schemeClr val="tx2"/>
+                </a:solidFill>
+                <a:latin typeface="Comic Sans MS" pitchFamily="66" charset="0"/>
+              </a:defRPr>
+            </a:lvl5pPr>
+            <a:lvl6pPr marL="457200" algn="ctr" rtl="0" fontAlgn="base">
+              <a:spcBef>
+                <a:spcPct val="0"/>
+              </a:spcBef>
+              <a:spcAft>
+                <a:spcPct val="0"/>
+              </a:spcAft>
+              <a:defRPr sz="3600" b="1">
+                <a:solidFill>
+                  <a:schemeClr val="tx2"/>
+                </a:solidFill>
+                <a:latin typeface="Comic Sans MS" pitchFamily="66" charset="0"/>
+              </a:defRPr>
+            </a:lvl6pPr>
+            <a:lvl7pPr marL="914400" algn="ctr" rtl="0" fontAlgn="base">
+              <a:spcBef>
+                <a:spcPct val="0"/>
+              </a:spcBef>
+              <a:spcAft>
+                <a:spcPct val="0"/>
+              </a:spcAft>
+              <a:defRPr sz="3600" b="1">
+                <a:solidFill>
+                  <a:schemeClr val="tx2"/>
+                </a:solidFill>
+                <a:latin typeface="Comic Sans MS" pitchFamily="66" charset="0"/>
+              </a:defRPr>
+            </a:lvl7pPr>
+            <a:lvl8pPr marL="1371600" algn="ctr" rtl="0" fontAlgn="base">
+              <a:spcBef>
+                <a:spcPct val="0"/>
+              </a:spcBef>
+              <a:spcAft>
+                <a:spcPct val="0"/>
+              </a:spcAft>
+              <a:defRPr sz="3600" b="1">
+                <a:solidFill>
+                  <a:schemeClr val="tx2"/>
+                </a:solidFill>
+                <a:latin typeface="Comic Sans MS" pitchFamily="66" charset="0"/>
+              </a:defRPr>
+            </a:lvl8pPr>
+            <a:lvl9pPr marL="1828800" algn="ctr" rtl="0" fontAlgn="base">
+              <a:spcBef>
+                <a:spcPct val="0"/>
+              </a:spcBef>
+              <a:spcAft>
+                <a:spcPct val="0"/>
+              </a:spcAft>
+              <a:defRPr sz="3600" b="1">
+                <a:solidFill>
+                  <a:schemeClr val="tx2"/>
+                </a:solidFill>
+                <a:latin typeface="Comic Sans MS" pitchFamily="66" charset="0"/>
+              </a:defRPr>
+            </a:lvl9pPr>
+          </a:lstStyle>
+          <a:p>
+            <a:pPr eaLnBrk="1" hangingPunct="1"/>
+            <a:r>
+              <a:rPr lang="en-US" sz="4400" dirty="0" smtClean="0">
+                <a:solidFill>
+                  <a:schemeClr val="tx1"/>
+                </a:solidFill>
+                <a:latin typeface="Comic Sans MS"/>
+                <a:cs typeface="Comic Sans MS"/>
+              </a:rPr>
+              <a:t>98% </a:t>
+            </a:r>
+            <a:r>
+              <a:rPr lang="en-US" sz="4400" dirty="0" smtClean="0">
+                <a:solidFill>
+                  <a:schemeClr val="tx1"/>
+                </a:solidFill>
+                <a:latin typeface="Comic Sans MS"/>
+                <a:cs typeface="Comic Sans MS"/>
+              </a:rPr>
+              <a:t>accuracy still useful</a:t>
+            </a:r>
+          </a:p>
+        </p:txBody>
+      </p:sp>
+      <p:sp>
+        <p:nvSpPr>
+          <p:cNvPr id="7" name="Rectangle 4"/>
+          <p:cNvSpPr txBox="1">
+            <a:spLocks noChangeArrowheads="1"/>
+          </p:cNvSpPr>
+          <p:nvPr/>
+        </p:nvSpPr>
+        <p:spPr bwMode="auto">
+          <a:xfrm>
+            <a:off x="7696200" y="6629400"/>
+            <a:ext cx="1447800" cy="228600"/>
+          </a:xfrm>
+          <a:prstGeom prst="rect">
+            <a:avLst/>
+          </a:prstGeom>
+          <a:noFill/>
+          <a:ln w="9525">
+            <a:noFill/>
+            <a:miter lim="800000"/>
+            <a:headEnd/>
+            <a:tailEnd/>
+          </a:ln>
+          <a:effectLst/>
+        </p:spPr>
+        <p:txBody>
+          <a:bodyPr vert="horz" wrap="square" lIns="91440" tIns="45720" rIns="91440" bIns="45720" numCol="1" anchor="t" anchorCtr="0" compatLnSpc="1">
+            <a:prstTxWarp prst="textNoShape">
+              <a:avLst/>
+            </a:prstTxWarp>
+          </a:bodyPr>
+          <a:lstStyle>
+            <a:lvl1pPr algn="r">
+              <a:defRPr sz="1200" dirty="0" err="1" smtClean="0">
+                <a:latin typeface="+mn-lt"/>
+              </a:defRPr>
+            </a:lvl1pPr>
+          </a:lstStyle>
+          <a:p>
+            <a:pPr marL="0" marR="0" lvl="0" indent="0" algn="r" defTabSz="914400" rtl="0" eaLnBrk="1" fontAlgn="base" latinLnBrk="0" hangingPunct="1">
+              <a:lnSpc>
+                <a:spcPct val="100000"/>
+              </a:lnSpc>
+              <a:spcBef>
+                <a:spcPct val="0"/>
+              </a:spcBef>
+              <a:spcAft>
+                <a:spcPct val="0"/>
+              </a:spcAft>
+              <a:buClrTx/>
+              <a:buSzTx/>
+              <a:buFontTx/>
+              <a:buNone/>
+              <a:tabLst/>
+              <a:defRPr/>
+            </a:pPr>
+            <a:r>
+              <a:rPr kumimoji="0" lang="en-US" sz="1200" b="0" i="0" u="none" strike="noStrike" kern="1200" cap="none" spc="0" normalizeH="0" baseline="0" noProof="0" dirty="0" smtClean="0">
+                <a:ln>
+                  <a:noFill/>
+                </a:ln>
+                <a:solidFill>
+                  <a:schemeClr val="tx1"/>
+                </a:solidFill>
+                <a:effectLst/>
+                <a:uLnTx/>
+                <a:uFillTx/>
+                <a:latin typeface="Comic Sans MS"/>
+                <a:ea typeface="+mn-ea"/>
+                <a:cs typeface="Comic Sans MS"/>
+              </a:rPr>
+              <a:t>testing.</a:t>
+            </a:r>
+            <a:fld id="{B9A0B45D-6AFD-413C-B761-B121FB8BE940}" type="slidenum">
+              <a:rPr kumimoji="0" lang="en-US" sz="1200" b="0" i="0" u="none" strike="noStrike" kern="1200" cap="none" spc="0" normalizeH="0" baseline="0" noProof="0" smtClean="0">
+                <a:ln>
+                  <a:noFill/>
+                </a:ln>
+                <a:solidFill>
+                  <a:schemeClr val="tx1"/>
+                </a:solidFill>
+                <a:effectLst/>
+                <a:uLnTx/>
+                <a:uFillTx/>
+                <a:latin typeface="Comic Sans MS"/>
+                <a:ea typeface="+mn-ea"/>
+                <a:cs typeface="Comic Sans MS"/>
+              </a:rPr>
+              <a:pPr marL="0" marR="0" lvl="0" indent="0" algn="r" defTabSz="914400" rtl="0" eaLnBrk="1" fontAlgn="base" latinLnBrk="0" hangingPunct="1">
+                <a:lnSpc>
+                  <a:spcPct val="100000"/>
+                </a:lnSpc>
+                <a:spcBef>
+                  <a:spcPct val="0"/>
+                </a:spcBef>
+                <a:spcAft>
+                  <a:spcPct val="0"/>
+                </a:spcAft>
+                <a:buClrTx/>
+                <a:buSzTx/>
+                <a:buFontTx/>
+                <a:buNone/>
+                <a:tabLst/>
+                <a:defRPr/>
+              </a:pPr>
+              <a:t>41</a:t>
+            </a:fld>
+            <a:endParaRPr kumimoji="0" lang="en-US" sz="1200" b="0" i="0" u="none" strike="noStrike" kern="1200" cap="none" spc="0" normalizeH="0" baseline="0" noProof="0" dirty="0">
+              <a:ln>
+                <a:noFill/>
+              </a:ln>
+              <a:solidFill>
+                <a:schemeClr val="tx1"/>
+              </a:solidFill>
+              <a:effectLst/>
+              <a:uLnTx/>
+              <a:uFillTx/>
+              <a:latin typeface="Comic Sans MS"/>
+              <a:ea typeface="+mn-ea"/>
+              <a:cs typeface="Comic Sans MS"/>
+            </a:endParaRPr>
+          </a:p>
+        </p:txBody>
+      </p:sp>
+    </p:spTree>
+    <p:extLst>
+      <p:ext uri="{BB962C8B-B14F-4D97-AF65-F5344CB8AC3E}">
+        <p14:creationId xmlns:p14="http://schemas.microsoft.com/office/powerpoint/2010/main" val="2916619395"/>
+      </p:ext>
+    </p:extLst>
+  </p:cSld>
+  <p:clrMapOvr>
+    <a:masterClrMapping/>
+  </p:clrMapOvr>
+  <mc:AlternateContent xmlns:mc="http://schemas.openxmlformats.org/markup-compatibility/2006" xmlns:p14="http://schemas.microsoft.com/office/powerpoint/2010/main">
+    <mc:Choice Requires="p14">
+      <p:transition spd="med" p14:dur="700" advClick="0">
+        <p:fade/>
+      </p:transition>
+    </mc:Choice>
+    <mc:Fallback xmlns="">
+      <p:transition xmlns:p14="http://schemas.microsoft.com/office/powerpoint/2010/main" spd="med" advClick="0">
+        <p:fade/>
+      </p:transition>
+    </mc:Fallback>
+  </mc:AlternateContent>
+  <p:timing>
+    <p:tnLst>
+      <p:par>
+        <p:cTn xmlns:p14="http://schemas.microsoft.com/office/powerpoint/2010/main" id="1" dur="indefinite" restart="never" nodeType="tmRoot"/>
+      </p:par>
+    </p:tnLst>
+  </p:timing>
+</p:sld>
+</file>
+
+<file path=ppt/slides/slide42.xml><?xml version="1.0" encoding="utf-8"?>
+<p:sld xmlns:a="http://schemas.openxmlformats.org/drawingml/2006/main" xmlns:r="http://schemas.openxmlformats.org/officeDocument/2006/relationships" xmlns:p="http://schemas.openxmlformats.org/presentationml/2006/main">
+  <p:cSld>
+    <p:spTree>
+      <p:nvGrpSpPr>
+        <p:cNvPr id="1" name=""/>
+        <p:cNvGrpSpPr/>
+        <p:nvPr/>
+      </p:nvGrpSpPr>
+      <p:grpSpPr>
+        <a:xfrm>
+          <a:off x="0" y="0"/>
+          <a:ext cx="0" cy="0"/>
+          <a:chOff x="0" y="0"/>
+          <a:chExt cx="0" cy="0"/>
+        </a:xfrm>
+      </p:grpSpPr>
+      <p:sp>
+        <p:nvSpPr>
+          <p:cNvPr id="6" name="TextBox 5"/>
+          <p:cNvSpPr txBox="1"/>
+          <p:nvPr/>
+        </p:nvSpPr>
+        <p:spPr>
+          <a:xfrm>
+            <a:off x="299715" y="1495282"/>
+            <a:ext cx="8615685" cy="3914918"/>
+          </a:xfrm>
+          <a:prstGeom prst="rect">
+            <a:avLst/>
+          </a:prstGeom>
+          <a:noFill/>
+        </p:spPr>
+        <p:txBody>
+          <a:bodyPr wrap="none" rtlCol="0">
+            <a:spAutoFit/>
+          </a:bodyPr>
+          <a:lstStyle/>
+          <a:p>
+            <a:pPr algn="l"/>
+            <a:r>
+              <a:rPr lang="en-US" sz="5400" dirty="0" smtClean="0">
+                <a:latin typeface="Comic Sans MS"/>
+                <a:cs typeface="Comic Sans MS"/>
+              </a:rPr>
+              <a:t>Instead, medicate </a:t>
+            </a:r>
+            <a:r>
+              <a:rPr lang="en-US" sz="5400" dirty="0" smtClean="0">
+                <a:latin typeface="Comic Sans MS"/>
+                <a:cs typeface="Comic Sans MS"/>
+              </a:rPr>
+              <a:t>the </a:t>
+            </a:r>
+            <a:r>
+              <a:rPr lang="en-US" sz="5400" dirty="0" smtClean="0">
+                <a:solidFill>
+                  <a:srgbClr val="0000E5"/>
+                </a:solidFill>
+                <a:latin typeface="Comic Sans MS"/>
+                <a:cs typeface="Comic Sans MS"/>
+              </a:rPr>
+              <a:t>7M</a:t>
+            </a:r>
+            <a:endParaRPr lang="en-US" sz="5400" dirty="0">
+              <a:latin typeface="Comic Sans MS"/>
+              <a:cs typeface="Comic Sans MS"/>
+            </a:endParaRPr>
+          </a:p>
+          <a:p>
+            <a:pPr algn="l"/>
+            <a:r>
+              <a:rPr lang="en-US" sz="5400" dirty="0" smtClean="0">
+                <a:latin typeface="Comic Sans MS"/>
+                <a:cs typeface="Comic Sans MS"/>
+              </a:rPr>
+              <a:t>who test positive.  All the</a:t>
+            </a:r>
+          </a:p>
+          <a:p>
+            <a:pPr algn="l"/>
+            <a:r>
+              <a:rPr lang="en-US" sz="5400" dirty="0" smtClean="0">
+                <a:latin typeface="Comic Sans MS"/>
+                <a:cs typeface="Comic Sans MS"/>
+              </a:rPr>
+              <a:t>sick people are </a:t>
+            </a:r>
+            <a:r>
+              <a:rPr lang="en-US" sz="5400" dirty="0" smtClean="0">
+                <a:solidFill>
+                  <a:srgbClr val="008000"/>
+                </a:solidFill>
+                <a:latin typeface="Comic Sans MS"/>
+                <a:cs typeface="Comic Sans MS"/>
+              </a:rPr>
+              <a:t>sure</a:t>
+            </a:r>
+            <a:r>
+              <a:rPr lang="en-US" sz="5400" dirty="0" smtClean="0">
+                <a:latin typeface="Comic Sans MS"/>
+                <a:cs typeface="Comic Sans MS"/>
+              </a:rPr>
+              <a:t> to be</a:t>
+            </a:r>
+          </a:p>
+          <a:p>
+            <a:pPr algn="l"/>
+            <a:r>
+              <a:rPr lang="en-US" sz="5400" dirty="0" smtClean="0">
+                <a:latin typeface="Comic Sans MS"/>
+                <a:cs typeface="Comic Sans MS"/>
+              </a:rPr>
+              <a:t>among these.</a:t>
+            </a:r>
+            <a:endParaRPr lang="en-US" sz="5400" dirty="0" smtClean="0">
+              <a:latin typeface="Comic Sans MS"/>
+              <a:cs typeface="Comic Sans MS"/>
+            </a:endParaRPr>
+          </a:p>
+        </p:txBody>
+      </p:sp>
+      <p:sp>
+        <p:nvSpPr>
+          <p:cNvPr id="5" name="Rectangle 4"/>
+          <p:cNvSpPr txBox="1">
+            <a:spLocks noChangeArrowheads="1"/>
+          </p:cNvSpPr>
+          <p:nvPr/>
+        </p:nvSpPr>
+        <p:spPr bwMode="auto">
+          <a:xfrm>
+            <a:off x="1355099" y="152400"/>
+            <a:ext cx="7266290" cy="1112484"/>
+          </a:xfrm>
+          <a:prstGeom prst="rect">
+            <a:avLst/>
+          </a:prstGeom>
+          <a:noFill/>
+          <a:ln w="9525">
+            <a:noFill/>
+            <a:miter lim="800000"/>
+            <a:headEnd/>
+            <a:tailEnd/>
+          </a:ln>
+        </p:spPr>
+        <p:txBody>
+          <a:bodyPr vert="horz" wrap="square" lIns="91440" tIns="45720" rIns="91440" bIns="45720" numCol="1" anchor="ctr" anchorCtr="0" compatLnSpc="1">
+            <a:prstTxWarp prst="textNoShape">
+              <a:avLst/>
+            </a:prstTxWarp>
+          </a:bodyPr>
+          <a:lstStyle>
+            <a:lvl1pPr algn="ctr" rtl="0" eaLnBrk="0" fontAlgn="base" hangingPunct="0">
+              <a:spcBef>
+                <a:spcPct val="0"/>
+              </a:spcBef>
+              <a:spcAft>
+                <a:spcPct val="0"/>
+              </a:spcAft>
+              <a:defRPr sz="3200" b="1">
+                <a:solidFill>
+                  <a:schemeClr val="tx2"/>
+                </a:solidFill>
+                <a:latin typeface="+mj-lt"/>
+                <a:ea typeface="+mj-ea"/>
+                <a:cs typeface="+mj-cs"/>
+              </a:defRPr>
+            </a:lvl1pPr>
+            <a:lvl2pPr algn="ctr" rtl="0" eaLnBrk="0" fontAlgn="base" hangingPunct="0">
+              <a:spcBef>
+                <a:spcPct val="0"/>
+              </a:spcBef>
+              <a:spcAft>
+                <a:spcPct val="0"/>
+              </a:spcAft>
+              <a:defRPr sz="3600" b="1">
+                <a:solidFill>
+                  <a:schemeClr val="tx2"/>
+                </a:solidFill>
+                <a:latin typeface="Comic Sans MS" pitchFamily="66" charset="0"/>
+              </a:defRPr>
+            </a:lvl2pPr>
+            <a:lvl3pPr algn="ctr" rtl="0" eaLnBrk="0" fontAlgn="base" hangingPunct="0">
+              <a:spcBef>
+                <a:spcPct val="0"/>
+              </a:spcBef>
+              <a:spcAft>
+                <a:spcPct val="0"/>
+              </a:spcAft>
+              <a:defRPr sz="3600" b="1">
+                <a:solidFill>
+                  <a:schemeClr val="tx2"/>
+                </a:solidFill>
+                <a:latin typeface="Comic Sans MS" pitchFamily="66" charset="0"/>
+              </a:defRPr>
+            </a:lvl3pPr>
+            <a:lvl4pPr algn="ctr" rtl="0" eaLnBrk="0" fontAlgn="base" hangingPunct="0">
+              <a:spcBef>
+                <a:spcPct val="0"/>
+              </a:spcBef>
+              <a:spcAft>
+                <a:spcPct val="0"/>
+              </a:spcAft>
+              <a:defRPr sz="3600" b="1">
+                <a:solidFill>
+                  <a:schemeClr val="tx2"/>
+                </a:solidFill>
+                <a:latin typeface="Comic Sans MS" pitchFamily="66" charset="0"/>
+              </a:defRPr>
+            </a:lvl4pPr>
+            <a:lvl5pPr algn="ctr" rtl="0" eaLnBrk="0" fontAlgn="base" hangingPunct="0">
+              <a:spcBef>
+                <a:spcPct val="0"/>
+              </a:spcBef>
+              <a:spcAft>
+                <a:spcPct val="0"/>
+              </a:spcAft>
+              <a:defRPr sz="3600" b="1">
+                <a:solidFill>
+                  <a:schemeClr val="tx2"/>
+                </a:solidFill>
+                <a:latin typeface="Comic Sans MS" pitchFamily="66" charset="0"/>
+              </a:defRPr>
+            </a:lvl5pPr>
+            <a:lvl6pPr marL="457200" algn="ctr" rtl="0" fontAlgn="base">
+              <a:spcBef>
+                <a:spcPct val="0"/>
+              </a:spcBef>
+              <a:spcAft>
+                <a:spcPct val="0"/>
+              </a:spcAft>
+              <a:defRPr sz="3600" b="1">
+                <a:solidFill>
+                  <a:schemeClr val="tx2"/>
+                </a:solidFill>
+                <a:latin typeface="Comic Sans MS" pitchFamily="66" charset="0"/>
+              </a:defRPr>
+            </a:lvl6pPr>
+            <a:lvl7pPr marL="914400" algn="ctr" rtl="0" fontAlgn="base">
+              <a:spcBef>
+                <a:spcPct val="0"/>
+              </a:spcBef>
+              <a:spcAft>
+                <a:spcPct val="0"/>
+              </a:spcAft>
+              <a:defRPr sz="3600" b="1">
+                <a:solidFill>
+                  <a:schemeClr val="tx2"/>
+                </a:solidFill>
+                <a:latin typeface="Comic Sans MS" pitchFamily="66" charset="0"/>
+              </a:defRPr>
+            </a:lvl7pPr>
+            <a:lvl8pPr marL="1371600" algn="ctr" rtl="0" fontAlgn="base">
+              <a:spcBef>
+                <a:spcPct val="0"/>
+              </a:spcBef>
+              <a:spcAft>
+                <a:spcPct val="0"/>
+              </a:spcAft>
+              <a:defRPr sz="3600" b="1">
+                <a:solidFill>
+                  <a:schemeClr val="tx2"/>
+                </a:solidFill>
+                <a:latin typeface="Comic Sans MS" pitchFamily="66" charset="0"/>
+              </a:defRPr>
+            </a:lvl8pPr>
+            <a:lvl9pPr marL="1828800" algn="ctr" rtl="0" fontAlgn="base">
+              <a:spcBef>
+                <a:spcPct val="0"/>
+              </a:spcBef>
+              <a:spcAft>
+                <a:spcPct val="0"/>
+              </a:spcAft>
+              <a:defRPr sz="3600" b="1">
+                <a:solidFill>
+                  <a:schemeClr val="tx2"/>
+                </a:solidFill>
+                <a:latin typeface="Comic Sans MS" pitchFamily="66" charset="0"/>
+              </a:defRPr>
+            </a:lvl9pPr>
+          </a:lstStyle>
+          <a:p>
+            <a:pPr eaLnBrk="1" hangingPunct="1"/>
+            <a:r>
+              <a:rPr lang="en-US" sz="4400" dirty="0" smtClean="0">
+                <a:solidFill>
+                  <a:schemeClr val="tx1"/>
+                </a:solidFill>
+                <a:latin typeface="Comic Sans MS"/>
+                <a:cs typeface="Comic Sans MS"/>
+              </a:rPr>
+              <a:t>98% </a:t>
+            </a:r>
+            <a:r>
+              <a:rPr lang="en-US" sz="4400" dirty="0" smtClean="0">
+                <a:solidFill>
+                  <a:schemeClr val="tx1"/>
+                </a:solidFill>
+                <a:latin typeface="Comic Sans MS"/>
+                <a:cs typeface="Comic Sans MS"/>
+              </a:rPr>
+              <a:t>accuracy still useful</a:t>
+            </a:r>
+          </a:p>
+        </p:txBody>
+      </p:sp>
+      <p:sp>
+        <p:nvSpPr>
+          <p:cNvPr id="7" name="Rectangle 4"/>
+          <p:cNvSpPr txBox="1">
+            <a:spLocks noChangeArrowheads="1"/>
+          </p:cNvSpPr>
+          <p:nvPr/>
+        </p:nvSpPr>
+        <p:spPr bwMode="auto">
+          <a:xfrm>
+            <a:off x="7696200" y="6629400"/>
+            <a:ext cx="1447800" cy="228600"/>
+          </a:xfrm>
+          <a:prstGeom prst="rect">
+            <a:avLst/>
+          </a:prstGeom>
+          <a:noFill/>
+          <a:ln w="9525">
+            <a:noFill/>
+            <a:miter lim="800000"/>
+            <a:headEnd/>
+            <a:tailEnd/>
+          </a:ln>
+          <a:effectLst/>
+        </p:spPr>
+        <p:txBody>
+          <a:bodyPr vert="horz" wrap="square" lIns="91440" tIns="45720" rIns="91440" bIns="45720" numCol="1" anchor="t" anchorCtr="0" compatLnSpc="1">
+            <a:prstTxWarp prst="textNoShape">
+              <a:avLst/>
+            </a:prstTxWarp>
+          </a:bodyPr>
+          <a:lstStyle>
+            <a:lvl1pPr algn="r">
+              <a:defRPr sz="1200" dirty="0" err="1" smtClean="0">
+                <a:latin typeface="+mn-lt"/>
+              </a:defRPr>
+            </a:lvl1pPr>
+          </a:lstStyle>
+          <a:p>
+            <a:pPr marL="0" marR="0" lvl="0" indent="0" algn="r" defTabSz="914400" rtl="0" eaLnBrk="1" fontAlgn="base" latinLnBrk="0" hangingPunct="1">
+              <a:lnSpc>
+                <a:spcPct val="100000"/>
+              </a:lnSpc>
+              <a:spcBef>
+                <a:spcPct val="0"/>
+              </a:spcBef>
+              <a:spcAft>
+                <a:spcPct val="0"/>
+              </a:spcAft>
+              <a:buClrTx/>
+              <a:buSzTx/>
+              <a:buFontTx/>
+              <a:buNone/>
+              <a:tabLst/>
+              <a:defRPr/>
+            </a:pPr>
+            <a:r>
+              <a:rPr kumimoji="0" lang="en-US" sz="1200" b="0" i="0" u="none" strike="noStrike" kern="1200" cap="none" spc="0" normalizeH="0" baseline="0" noProof="0" dirty="0" smtClean="0">
+                <a:ln>
+                  <a:noFill/>
+                </a:ln>
+                <a:solidFill>
+                  <a:schemeClr val="tx1"/>
+                </a:solidFill>
+                <a:effectLst/>
+                <a:uLnTx/>
+                <a:uFillTx/>
+                <a:latin typeface="Comic Sans MS"/>
+                <a:ea typeface="+mn-ea"/>
+                <a:cs typeface="Comic Sans MS"/>
+              </a:rPr>
+              <a:t>testing.</a:t>
+            </a:r>
+            <a:fld id="{B9A0B45D-6AFD-413C-B761-B121FB8BE940}" type="slidenum">
+              <a:rPr kumimoji="0" lang="en-US" sz="1200" b="0" i="0" u="none" strike="noStrike" kern="1200" cap="none" spc="0" normalizeH="0" baseline="0" noProof="0" smtClean="0">
+                <a:ln>
+                  <a:noFill/>
+                </a:ln>
+                <a:solidFill>
+                  <a:schemeClr val="tx1"/>
+                </a:solidFill>
+                <a:effectLst/>
+                <a:uLnTx/>
+                <a:uFillTx/>
+                <a:latin typeface="Comic Sans MS"/>
+                <a:ea typeface="+mn-ea"/>
+                <a:cs typeface="Comic Sans MS"/>
+              </a:rPr>
+              <a:pPr marL="0" marR="0" lvl="0" indent="0" algn="r" defTabSz="914400" rtl="0" eaLnBrk="1" fontAlgn="base" latinLnBrk="0" hangingPunct="1">
+                <a:lnSpc>
+                  <a:spcPct val="100000"/>
+                </a:lnSpc>
+                <a:spcBef>
+                  <a:spcPct val="0"/>
+                </a:spcBef>
+                <a:spcAft>
+                  <a:spcPct val="0"/>
+                </a:spcAft>
+                <a:buClrTx/>
+                <a:buSzTx/>
+                <a:buFontTx/>
+                <a:buNone/>
+                <a:tabLst/>
+                <a:defRPr/>
+              </a:pPr>
+              <a:t>42</a:t>
+            </a:fld>
+            <a:endParaRPr kumimoji="0" lang="en-US" sz="1200" b="0" i="0" u="none" strike="noStrike" kern="1200" cap="none" spc="0" normalizeH="0" baseline="0" noProof="0" dirty="0">
+              <a:ln>
+                <a:noFill/>
+              </a:ln>
+              <a:solidFill>
+                <a:schemeClr val="tx1"/>
+              </a:solidFill>
+              <a:effectLst/>
+              <a:uLnTx/>
+              <a:uFillTx/>
+              <a:latin typeface="Comic Sans MS"/>
+              <a:ea typeface="+mn-ea"/>
+              <a:cs typeface="Comic Sans MS"/>
+            </a:endParaRPr>
+          </a:p>
+        </p:txBody>
+      </p:sp>
+    </p:spTree>
+    <p:extLst>
+      <p:ext uri="{BB962C8B-B14F-4D97-AF65-F5344CB8AC3E}">
+        <p14:creationId xmlns:p14="http://schemas.microsoft.com/office/powerpoint/2010/main" val="3888538358"/>
+      </p:ext>
+    </p:extLst>
+  </p:cSld>
+  <p:clrMapOvr>
+    <a:masterClrMapping/>
+  </p:clrMapOvr>
+  <mc:AlternateContent xmlns:mc="http://schemas.openxmlformats.org/markup-compatibility/2006" xmlns:p14="http://schemas.microsoft.com/office/powerpoint/2010/main">
+    <mc:Choice Requires="p14">
+      <p:transition spd="med" p14:dur="700" advClick="0">
+        <p:fade/>
+      </p:transition>
+    </mc:Choice>
+    <mc:Fallback xmlns="">
+      <p:transition xmlns:p14="http://schemas.microsoft.com/office/powerpoint/2010/main" spd="med" advClick="0">
         <p:fade/>
       </p:transition>
     </mc:Fallback>
@@ -16903,7 +20457,7 @@
           <a:graphicData uri="http://schemas.openxmlformats.org/presentationml/2006/ole">
             <mc:AlternateContent xmlns:mc="http://schemas.openxmlformats.org/markup-compatibility/2006">
               <mc:Choice xmlns:v="urn:schemas-microsoft-com:vml" Requires="v">
-                <p:oleObj spid="_x0000_s92194" name="Equation" r:id="rId4" imgW="1714500" imgH="241300" progId="Equation.DSMT4">
+                <p:oleObj spid="_x0000_s92200" name="Equation" r:id="rId4" imgW="1714500" imgH="241300" progId="Equation.DSMT4">
                   <p:embed/>
                 </p:oleObj>
               </mc:Choice>
@@ -17425,7 +20979,7 @@
           <a:graphicData uri="http://schemas.openxmlformats.org/presentationml/2006/ole">
             <mc:AlternateContent xmlns:mc="http://schemas.openxmlformats.org/markup-compatibility/2006">
               <mc:Choice xmlns:v="urn:schemas-microsoft-com:vml" Requires="v">
-                <p:oleObj spid="_x0000_s87105" name="Equation" r:id="rId4" imgW="1714500" imgH="241300" progId="Equation.DSMT4">
+                <p:oleObj spid="_x0000_s87116" name="Equation" r:id="rId4" imgW="1714500" imgH="241300" progId="Equation.DSMT4">
                   <p:embed/>
                 </p:oleObj>
               </mc:Choice>
@@ -17568,7 +21122,7 @@
           <a:graphicData uri="http://schemas.openxmlformats.org/presentationml/2006/ole">
             <mc:AlternateContent xmlns:mc="http://schemas.openxmlformats.org/markup-compatibility/2006">
               <mc:Choice xmlns:v="urn:schemas-microsoft-com:vml" Requires="v">
-                <p:oleObj spid="_x0000_s87106" name="Equation" r:id="rId6" imgW="1574800" imgH="469900" progId="Equation.DSMT4">
+                <p:oleObj spid="_x0000_s87117" name="Equation" r:id="rId6" imgW="1574800" imgH="469900" progId="Equation.DSMT4">
                   <p:embed/>
                 </p:oleObj>
               </mc:Choice>
@@ -17986,7 +21540,7 @@
           <a:graphicData uri="http://schemas.openxmlformats.org/presentationml/2006/ole">
             <mc:AlternateContent xmlns:mc="http://schemas.openxmlformats.org/markup-compatibility/2006">
               <mc:Choice xmlns:v="urn:schemas-microsoft-com:vml" Requires="v">
-                <p:oleObj spid="_x0000_s91173" name="Equation" r:id="rId4" imgW="1270000" imgH="469900" progId="Equation.DSMT4">
+                <p:oleObj spid="_x0000_s91179" name="Equation" r:id="rId4" imgW="1270000" imgH="469900" progId="Equation.DSMT4">
                   <p:embed/>
                 </p:oleObj>
               </mc:Choice>

</xml_diff>